<commit_message>
update Kosy. - Bezeichnungen
</commit_message>
<xml_diff>
--- a/Übersicht_3DBeam.pptx
+++ b/Übersicht_3DBeam.pptx
@@ -7,6 +7,7 @@
   <p:sldIdLst>
     <p:sldId id="256" r:id="rId2"/>
     <p:sldId id="257" r:id="rId3"/>
+    <p:sldId id="258" r:id="rId4"/>
   </p:sldIdLst>
   <p:sldSz cx="12192000" cy="6858000"/>
   <p:notesSz cx="6858000" cy="9144000"/>
@@ -260,7 +261,7 @@
           <a:p>
             <a:fld id="{AC4F5CAE-E926-477B-8070-DB19FCEE5F45}" type="datetimeFigureOut">
               <a:rPr lang="de-DE" smtClean="0"/>
-              <a:t>10.02.2023</a:t>
+              <a:t>15.02.2023</a:t>
             </a:fld>
             <a:endParaRPr lang="de-DE"/>
           </a:p>
@@ -458,7 +459,7 @@
           <a:p>
             <a:fld id="{AC4F5CAE-E926-477B-8070-DB19FCEE5F45}" type="datetimeFigureOut">
               <a:rPr lang="de-DE" smtClean="0"/>
-              <a:t>10.02.2023</a:t>
+              <a:t>15.02.2023</a:t>
             </a:fld>
             <a:endParaRPr lang="de-DE"/>
           </a:p>
@@ -666,7 +667,7 @@
           <a:p>
             <a:fld id="{AC4F5CAE-E926-477B-8070-DB19FCEE5F45}" type="datetimeFigureOut">
               <a:rPr lang="de-DE" smtClean="0"/>
-              <a:t>10.02.2023</a:t>
+              <a:t>15.02.2023</a:t>
             </a:fld>
             <a:endParaRPr lang="de-DE"/>
           </a:p>
@@ -864,7 +865,7 @@
           <a:p>
             <a:fld id="{AC4F5CAE-E926-477B-8070-DB19FCEE5F45}" type="datetimeFigureOut">
               <a:rPr lang="de-DE" smtClean="0"/>
-              <a:t>10.02.2023</a:t>
+              <a:t>15.02.2023</a:t>
             </a:fld>
             <a:endParaRPr lang="de-DE"/>
           </a:p>
@@ -1139,7 +1140,7 @@
           <a:p>
             <a:fld id="{AC4F5CAE-E926-477B-8070-DB19FCEE5F45}" type="datetimeFigureOut">
               <a:rPr lang="de-DE" smtClean="0"/>
-              <a:t>10.02.2023</a:t>
+              <a:t>15.02.2023</a:t>
             </a:fld>
             <a:endParaRPr lang="de-DE"/>
           </a:p>
@@ -1404,7 +1405,7 @@
           <a:p>
             <a:fld id="{AC4F5CAE-E926-477B-8070-DB19FCEE5F45}" type="datetimeFigureOut">
               <a:rPr lang="de-DE" smtClean="0"/>
-              <a:t>10.02.2023</a:t>
+              <a:t>15.02.2023</a:t>
             </a:fld>
             <a:endParaRPr lang="de-DE"/>
           </a:p>
@@ -1816,7 +1817,7 @@
           <a:p>
             <a:fld id="{AC4F5CAE-E926-477B-8070-DB19FCEE5F45}" type="datetimeFigureOut">
               <a:rPr lang="de-DE" smtClean="0"/>
-              <a:t>10.02.2023</a:t>
+              <a:t>15.02.2023</a:t>
             </a:fld>
             <a:endParaRPr lang="de-DE"/>
           </a:p>
@@ -1957,7 +1958,7 @@
           <a:p>
             <a:fld id="{AC4F5CAE-E926-477B-8070-DB19FCEE5F45}" type="datetimeFigureOut">
               <a:rPr lang="de-DE" smtClean="0"/>
-              <a:t>10.02.2023</a:t>
+              <a:t>15.02.2023</a:t>
             </a:fld>
             <a:endParaRPr lang="de-DE"/>
           </a:p>
@@ -2070,7 +2071,7 @@
           <a:p>
             <a:fld id="{AC4F5CAE-E926-477B-8070-DB19FCEE5F45}" type="datetimeFigureOut">
               <a:rPr lang="de-DE" smtClean="0"/>
-              <a:t>10.02.2023</a:t>
+              <a:t>15.02.2023</a:t>
             </a:fld>
             <a:endParaRPr lang="de-DE"/>
           </a:p>
@@ -2381,7 +2382,7 @@
           <a:p>
             <a:fld id="{AC4F5CAE-E926-477B-8070-DB19FCEE5F45}" type="datetimeFigureOut">
               <a:rPr lang="de-DE" smtClean="0"/>
-              <a:t>10.02.2023</a:t>
+              <a:t>15.02.2023</a:t>
             </a:fld>
             <a:endParaRPr lang="de-DE"/>
           </a:p>
@@ -2669,7 +2670,7 @@
           <a:p>
             <a:fld id="{AC4F5CAE-E926-477B-8070-DB19FCEE5F45}" type="datetimeFigureOut">
               <a:rPr lang="de-DE" smtClean="0"/>
-              <a:t>10.02.2023</a:t>
+              <a:t>15.02.2023</a:t>
             </a:fld>
             <a:endParaRPr lang="de-DE"/>
           </a:p>
@@ -2910,7 +2911,7 @@
           <a:p>
             <a:fld id="{AC4F5CAE-E926-477B-8070-DB19FCEE5F45}" type="datetimeFigureOut">
               <a:rPr lang="de-DE" smtClean="0"/>
-              <a:t>10.02.2023</a:t>
+              <a:t>15.02.2023</a:t>
             </a:fld>
             <a:endParaRPr lang="de-DE"/>
           </a:p>
@@ -6339,6 +6340,2447 @@
 </p:sld>
 </file>
 
+<file path=ppt/slides/slide3.xml><?xml version="1.0" encoding="utf-8"?>
+<p:sld xmlns:a="http://schemas.openxmlformats.org/drawingml/2006/main" xmlns:r="http://schemas.openxmlformats.org/officeDocument/2006/relationships" xmlns:p="http://schemas.openxmlformats.org/presentationml/2006/main">
+  <p:cSld>
+    <p:spTree>
+      <p:nvGrpSpPr>
+        <p:cNvPr id="1" name=""/>
+        <p:cNvGrpSpPr/>
+        <p:nvPr/>
+      </p:nvGrpSpPr>
+      <p:grpSpPr>
+        <a:xfrm>
+          <a:off x="0" y="0"/>
+          <a:ext cx="0" cy="0"/>
+          <a:chOff x="0" y="0"/>
+          <a:chExt cx="0" cy="0"/>
+        </a:xfrm>
+      </p:grpSpPr>
+      <p:pic>
+        <p:nvPicPr>
+          <p:cNvPr id="2" name="Grafik 1">
+            <a:extLst>
+              <a:ext uri="{FF2B5EF4-FFF2-40B4-BE49-F238E27FC236}">
+                <a16:creationId xmlns:a16="http://schemas.microsoft.com/office/drawing/2014/main" id="{4DD5ED16-24FB-4B78-A064-E5266E322B63}"/>
+              </a:ext>
+            </a:extLst>
+          </p:cNvPr>
+          <p:cNvPicPr>
+            <a:picLocks noChangeAspect="1"/>
+          </p:cNvPicPr>
+          <p:nvPr/>
+        </p:nvPicPr>
+        <p:blipFill>
+          <a:blip r:embed="rId2"/>
+          <a:stretch>
+            <a:fillRect/>
+          </a:stretch>
+        </p:blipFill>
+        <p:spPr>
+          <a:xfrm>
+            <a:off x="9382772" y="711847"/>
+            <a:ext cx="2540123" cy="3976501"/>
+          </a:xfrm>
+          <a:prstGeom prst="rect">
+            <a:avLst/>
+          </a:prstGeom>
+        </p:spPr>
+      </p:pic>
+      <p:grpSp>
+        <p:nvGrpSpPr>
+          <p:cNvPr id="47" name="Gruppieren 46">
+            <a:extLst>
+              <a:ext uri="{FF2B5EF4-FFF2-40B4-BE49-F238E27FC236}">
+                <a16:creationId xmlns:a16="http://schemas.microsoft.com/office/drawing/2014/main" id="{F0737200-EF92-4B6E-A981-697E0D6FC06D}"/>
+              </a:ext>
+            </a:extLst>
+          </p:cNvPr>
+          <p:cNvGrpSpPr/>
+          <p:nvPr/>
+        </p:nvGrpSpPr>
+        <p:grpSpPr>
+          <a:xfrm>
+            <a:off x="1809225" y="558709"/>
+            <a:ext cx="545745" cy="3261045"/>
+            <a:chOff x="2788220" y="1450655"/>
+            <a:chExt cx="545745" cy="3261045"/>
+          </a:xfrm>
+        </p:grpSpPr>
+        <p:cxnSp>
+          <p:nvCxnSpPr>
+            <p:cNvPr id="48" name="Gerader Verbinder 47">
+              <a:extLst>
+                <a:ext uri="{FF2B5EF4-FFF2-40B4-BE49-F238E27FC236}">
+                  <a16:creationId xmlns:a16="http://schemas.microsoft.com/office/drawing/2014/main" id="{324DC6A8-4A53-4DE5-B154-A6ED1C8D9E45}"/>
+                </a:ext>
+              </a:extLst>
+            </p:cNvPr>
+            <p:cNvCxnSpPr>
+              <a:cxnSpLocks/>
+            </p:cNvCxnSpPr>
+            <p:nvPr/>
+          </p:nvCxnSpPr>
+          <p:spPr>
+            <a:xfrm flipH="1" flipV="1">
+              <a:off x="3061093" y="1810642"/>
+              <a:ext cx="6939" cy="2901058"/>
+            </a:xfrm>
+            <a:prstGeom prst="line">
+              <a:avLst/>
+            </a:prstGeom>
+            <a:ln w="38100">
+              <a:solidFill>
+                <a:schemeClr val="tx1"/>
+              </a:solidFill>
+            </a:ln>
+          </p:spPr>
+          <p:style>
+            <a:lnRef idx="1">
+              <a:schemeClr val="accent1"/>
+            </a:lnRef>
+            <a:fillRef idx="0">
+              <a:schemeClr val="accent1"/>
+            </a:fillRef>
+            <a:effectRef idx="0">
+              <a:schemeClr val="accent1"/>
+            </a:effectRef>
+            <a:fontRef idx="minor">
+              <a:schemeClr val="tx1"/>
+            </a:fontRef>
+          </p:style>
+        </p:cxnSp>
+        <p:sp>
+          <p:nvSpPr>
+            <p:cNvPr id="49" name="Ellipse 48">
+              <a:extLst>
+                <a:ext uri="{FF2B5EF4-FFF2-40B4-BE49-F238E27FC236}">
+                  <a16:creationId xmlns:a16="http://schemas.microsoft.com/office/drawing/2014/main" id="{7A41BDD7-C514-47B8-8793-CCB4BF6481B9}"/>
+                </a:ext>
+              </a:extLst>
+            </p:cNvPr>
+            <p:cNvSpPr/>
+            <p:nvPr/>
+          </p:nvSpPr>
+          <p:spPr>
+            <a:xfrm>
+              <a:off x="2819793" y="1450655"/>
+              <a:ext cx="482600" cy="444878"/>
+            </a:xfrm>
+            <a:prstGeom prst="ellipse">
+              <a:avLst/>
+            </a:prstGeom>
+            <a:solidFill>
+              <a:schemeClr val="tx1"/>
+            </a:solidFill>
+            <a:ln>
+              <a:solidFill>
+                <a:schemeClr val="tx1"/>
+              </a:solidFill>
+            </a:ln>
+          </p:spPr>
+          <p:style>
+            <a:lnRef idx="2">
+              <a:schemeClr val="accent1">
+                <a:shade val="50000"/>
+              </a:schemeClr>
+            </a:lnRef>
+            <a:fillRef idx="1">
+              <a:schemeClr val="accent1"/>
+            </a:fillRef>
+            <a:effectRef idx="0">
+              <a:schemeClr val="accent1"/>
+            </a:effectRef>
+            <a:fontRef idx="minor">
+              <a:schemeClr val="lt1"/>
+            </a:fontRef>
+          </p:style>
+          <p:txBody>
+            <a:bodyPr rtlCol="0" anchor="ctr"/>
+            <a:lstStyle/>
+            <a:p>
+              <a:pPr algn="ctr"/>
+              <a:endParaRPr lang="de-DE"/>
+            </a:p>
+          </p:txBody>
+        </p:sp>
+        <p:sp>
+          <p:nvSpPr>
+            <p:cNvPr id="50" name="Ellipse 49">
+              <a:extLst>
+                <a:ext uri="{FF2B5EF4-FFF2-40B4-BE49-F238E27FC236}">
+                  <a16:creationId xmlns:a16="http://schemas.microsoft.com/office/drawing/2014/main" id="{35F7704E-F628-443D-9315-4520883BD575}"/>
+                </a:ext>
+              </a:extLst>
+            </p:cNvPr>
+            <p:cNvSpPr/>
+            <p:nvPr/>
+          </p:nvSpPr>
+          <p:spPr>
+            <a:xfrm>
+              <a:off x="2958612" y="2421561"/>
+              <a:ext cx="211538" cy="198032"/>
+            </a:xfrm>
+            <a:prstGeom prst="ellipse">
+              <a:avLst/>
+            </a:prstGeom>
+            <a:solidFill>
+              <a:schemeClr val="tx1"/>
+            </a:solidFill>
+            <a:ln>
+              <a:solidFill>
+                <a:schemeClr val="tx1"/>
+              </a:solidFill>
+            </a:ln>
+          </p:spPr>
+          <p:style>
+            <a:lnRef idx="2">
+              <a:schemeClr val="accent1">
+                <a:shade val="50000"/>
+              </a:schemeClr>
+            </a:lnRef>
+            <a:fillRef idx="1">
+              <a:schemeClr val="accent1"/>
+            </a:fillRef>
+            <a:effectRef idx="0">
+              <a:schemeClr val="accent1"/>
+            </a:effectRef>
+            <a:fontRef idx="minor">
+              <a:schemeClr val="lt1"/>
+            </a:fontRef>
+          </p:style>
+          <p:txBody>
+            <a:bodyPr rtlCol="0" anchor="ctr"/>
+            <a:lstStyle/>
+            <a:p>
+              <a:pPr algn="ctr"/>
+              <a:endParaRPr lang="de-DE"/>
+            </a:p>
+          </p:txBody>
+        </p:sp>
+        <p:sp>
+          <p:nvSpPr>
+            <p:cNvPr id="51" name="Ellipse 50">
+              <a:extLst>
+                <a:ext uri="{FF2B5EF4-FFF2-40B4-BE49-F238E27FC236}">
+                  <a16:creationId xmlns:a16="http://schemas.microsoft.com/office/drawing/2014/main" id="{F6B14651-15C4-4CAF-B204-108CC5CA40C1}"/>
+                </a:ext>
+              </a:extLst>
+            </p:cNvPr>
+            <p:cNvSpPr/>
+            <p:nvPr/>
+          </p:nvSpPr>
+          <p:spPr>
+            <a:xfrm>
+              <a:off x="2961072" y="3145621"/>
+              <a:ext cx="211538" cy="198032"/>
+            </a:xfrm>
+            <a:prstGeom prst="ellipse">
+              <a:avLst/>
+            </a:prstGeom>
+            <a:solidFill>
+              <a:schemeClr val="tx1"/>
+            </a:solidFill>
+            <a:ln>
+              <a:solidFill>
+                <a:schemeClr val="tx1"/>
+              </a:solidFill>
+            </a:ln>
+          </p:spPr>
+          <p:style>
+            <a:lnRef idx="2">
+              <a:schemeClr val="accent1">
+                <a:shade val="50000"/>
+              </a:schemeClr>
+            </a:lnRef>
+            <a:fillRef idx="1">
+              <a:schemeClr val="accent1"/>
+            </a:fillRef>
+            <a:effectRef idx="0">
+              <a:schemeClr val="accent1"/>
+            </a:effectRef>
+            <a:fontRef idx="minor">
+              <a:schemeClr val="lt1"/>
+            </a:fontRef>
+          </p:style>
+          <p:txBody>
+            <a:bodyPr rtlCol="0" anchor="ctr"/>
+            <a:lstStyle/>
+            <a:p>
+              <a:pPr algn="ctr"/>
+              <a:endParaRPr lang="de-DE"/>
+            </a:p>
+          </p:txBody>
+        </p:sp>
+        <p:sp>
+          <p:nvSpPr>
+            <p:cNvPr id="52" name="Ellipse 51">
+              <a:extLst>
+                <a:ext uri="{FF2B5EF4-FFF2-40B4-BE49-F238E27FC236}">
+                  <a16:creationId xmlns:a16="http://schemas.microsoft.com/office/drawing/2014/main" id="{BC495171-8F97-45A4-9CF6-EEC3C49EDAF3}"/>
+                </a:ext>
+              </a:extLst>
+            </p:cNvPr>
+            <p:cNvSpPr/>
+            <p:nvPr/>
+          </p:nvSpPr>
+          <p:spPr>
+            <a:xfrm>
+              <a:off x="2962263" y="3869681"/>
+              <a:ext cx="211538" cy="198032"/>
+            </a:xfrm>
+            <a:prstGeom prst="ellipse">
+              <a:avLst/>
+            </a:prstGeom>
+            <a:solidFill>
+              <a:schemeClr val="tx1"/>
+            </a:solidFill>
+            <a:ln>
+              <a:solidFill>
+                <a:schemeClr val="tx1"/>
+              </a:solidFill>
+            </a:ln>
+          </p:spPr>
+          <p:style>
+            <a:lnRef idx="2">
+              <a:schemeClr val="accent1">
+                <a:shade val="50000"/>
+              </a:schemeClr>
+            </a:lnRef>
+            <a:fillRef idx="1">
+              <a:schemeClr val="accent1"/>
+            </a:fillRef>
+            <a:effectRef idx="0">
+              <a:schemeClr val="accent1"/>
+            </a:effectRef>
+            <a:fontRef idx="minor">
+              <a:schemeClr val="lt1"/>
+            </a:fontRef>
+          </p:style>
+          <p:txBody>
+            <a:bodyPr rtlCol="0" anchor="ctr"/>
+            <a:lstStyle/>
+            <a:p>
+              <a:pPr algn="ctr"/>
+              <a:endParaRPr lang="de-DE"/>
+            </a:p>
+          </p:txBody>
+        </p:sp>
+        <p:cxnSp>
+          <p:nvCxnSpPr>
+            <p:cNvPr id="53" name="Gerader Verbinder 52">
+              <a:extLst>
+                <a:ext uri="{FF2B5EF4-FFF2-40B4-BE49-F238E27FC236}">
+                  <a16:creationId xmlns:a16="http://schemas.microsoft.com/office/drawing/2014/main" id="{2002789B-0F91-49C8-9769-0134AC86D014}"/>
+                </a:ext>
+              </a:extLst>
+            </p:cNvPr>
+            <p:cNvCxnSpPr/>
+            <p:nvPr/>
+          </p:nvCxnSpPr>
+          <p:spPr>
+            <a:xfrm>
+              <a:off x="2788220" y="4684063"/>
+              <a:ext cx="545745" cy="0"/>
+            </a:xfrm>
+            <a:prstGeom prst="line">
+              <a:avLst/>
+            </a:prstGeom>
+            <a:ln w="57150">
+              <a:solidFill>
+                <a:schemeClr val="tx1"/>
+              </a:solidFill>
+            </a:ln>
+          </p:spPr>
+          <p:style>
+            <a:lnRef idx="1">
+              <a:schemeClr val="accent1"/>
+            </a:lnRef>
+            <a:fillRef idx="0">
+              <a:schemeClr val="accent1"/>
+            </a:fillRef>
+            <a:effectRef idx="0">
+              <a:schemeClr val="accent1"/>
+            </a:effectRef>
+            <a:fontRef idx="minor">
+              <a:schemeClr val="tx1"/>
+            </a:fontRef>
+          </p:style>
+        </p:cxnSp>
+      </p:grpSp>
+      <p:sp>
+        <p:nvSpPr>
+          <p:cNvPr id="54" name="Textfeld 53">
+            <a:extLst>
+              <a:ext uri="{FF2B5EF4-FFF2-40B4-BE49-F238E27FC236}">
+                <a16:creationId xmlns:a16="http://schemas.microsoft.com/office/drawing/2014/main" id="{FBB70B4C-2054-438F-9602-2EB1E8785AD7}"/>
+              </a:ext>
+            </a:extLst>
+          </p:cNvPr>
+          <p:cNvSpPr txBox="1"/>
+          <p:nvPr/>
+        </p:nvSpPr>
+        <p:spPr>
+          <a:xfrm>
+            <a:off x="1676030" y="0"/>
+            <a:ext cx="1223192" cy="369332"/>
+          </a:xfrm>
+          <a:prstGeom prst="rect">
+            <a:avLst/>
+          </a:prstGeom>
+          <a:noFill/>
+        </p:spPr>
+        <p:txBody>
+          <a:bodyPr wrap="square" rtlCol="0">
+            <a:spAutoFit/>
+          </a:bodyPr>
+          <a:lstStyle/>
+          <a:p>
+            <a:r>
+              <a:rPr lang="de-DE" dirty="0"/>
+              <a:t>Balken 3D</a:t>
+            </a:r>
+          </a:p>
+        </p:txBody>
+      </p:sp>
+      <p:cxnSp>
+        <p:nvCxnSpPr>
+          <p:cNvPr id="55" name="Gerade Verbindung mit Pfeil 54">
+            <a:extLst>
+              <a:ext uri="{FF2B5EF4-FFF2-40B4-BE49-F238E27FC236}">
+                <a16:creationId xmlns:a16="http://schemas.microsoft.com/office/drawing/2014/main" id="{480664B8-213C-4DEE-9197-E52EA6D65874}"/>
+              </a:ext>
+            </a:extLst>
+          </p:cNvPr>
+          <p:cNvCxnSpPr/>
+          <p:nvPr/>
+        </p:nvCxnSpPr>
+        <p:spPr>
+          <a:xfrm flipV="1">
+            <a:off x="2058299" y="2948899"/>
+            <a:ext cx="0" cy="846307"/>
+          </a:xfrm>
+          <a:prstGeom prst="straightConnector1">
+            <a:avLst/>
+          </a:prstGeom>
+          <a:ln w="57150">
+            <a:solidFill>
+              <a:srgbClr val="FF0000"/>
+            </a:solidFill>
+            <a:tailEnd type="triangle"/>
+          </a:ln>
+        </p:spPr>
+        <p:style>
+          <a:lnRef idx="1">
+            <a:schemeClr val="accent1"/>
+          </a:lnRef>
+          <a:fillRef idx="0">
+            <a:schemeClr val="accent1"/>
+          </a:fillRef>
+          <a:effectRef idx="0">
+            <a:schemeClr val="accent1"/>
+          </a:effectRef>
+          <a:fontRef idx="minor">
+            <a:schemeClr val="tx1"/>
+          </a:fontRef>
+        </p:style>
+      </p:cxnSp>
+      <p:cxnSp>
+        <p:nvCxnSpPr>
+          <p:cNvPr id="56" name="Gerade Verbindung mit Pfeil 55">
+            <a:extLst>
+              <a:ext uri="{FF2B5EF4-FFF2-40B4-BE49-F238E27FC236}">
+                <a16:creationId xmlns:a16="http://schemas.microsoft.com/office/drawing/2014/main" id="{BD70B883-DB1F-4A2D-81F3-A2713AB1B633}"/>
+              </a:ext>
+            </a:extLst>
+          </p:cNvPr>
+          <p:cNvCxnSpPr>
+            <a:cxnSpLocks/>
+          </p:cNvCxnSpPr>
+          <p:nvPr/>
+        </p:nvCxnSpPr>
+        <p:spPr>
+          <a:xfrm flipV="1">
+            <a:off x="2058299" y="3795206"/>
+            <a:ext cx="817123" cy="1"/>
+          </a:xfrm>
+          <a:prstGeom prst="straightConnector1">
+            <a:avLst/>
+          </a:prstGeom>
+          <a:ln w="57150">
+            <a:solidFill>
+              <a:srgbClr val="FF0000"/>
+            </a:solidFill>
+            <a:tailEnd type="triangle"/>
+          </a:ln>
+        </p:spPr>
+        <p:style>
+          <a:lnRef idx="1">
+            <a:schemeClr val="accent1"/>
+          </a:lnRef>
+          <a:fillRef idx="0">
+            <a:schemeClr val="accent1"/>
+          </a:fillRef>
+          <a:effectRef idx="0">
+            <a:schemeClr val="accent1"/>
+          </a:effectRef>
+          <a:fontRef idx="minor">
+            <a:schemeClr val="tx1"/>
+          </a:fontRef>
+        </p:style>
+      </p:cxnSp>
+      <p:pic>
+        <p:nvPicPr>
+          <p:cNvPr id="57" name="Grafik 56">
+            <a:extLst>
+              <a:ext uri="{FF2B5EF4-FFF2-40B4-BE49-F238E27FC236}">
+                <a16:creationId xmlns:a16="http://schemas.microsoft.com/office/drawing/2014/main" id="{7CF2AA70-31C3-4F71-AC8A-A408CF648A84}"/>
+              </a:ext>
+            </a:extLst>
+          </p:cNvPr>
+          <p:cNvPicPr>
+            <a:picLocks noChangeAspect="1"/>
+          </p:cNvPicPr>
+          <p:nvPr/>
+        </p:nvPicPr>
+        <p:blipFill>
+          <a:blip r:embed="rId3"/>
+          <a:stretch>
+            <a:fillRect/>
+          </a:stretch>
+        </p:blipFill>
+        <p:spPr>
+          <a:xfrm rot="10621894">
+            <a:off x="2591581" y="2455011"/>
+            <a:ext cx="780356" cy="701101"/>
+          </a:xfrm>
+          <a:prstGeom prst="rect">
+            <a:avLst/>
+          </a:prstGeom>
+        </p:spPr>
+      </p:pic>
+      <p:sp>
+        <p:nvSpPr>
+          <p:cNvPr id="58" name="Textfeld 57">
+            <a:extLst>
+              <a:ext uri="{FF2B5EF4-FFF2-40B4-BE49-F238E27FC236}">
+                <a16:creationId xmlns:a16="http://schemas.microsoft.com/office/drawing/2014/main" id="{EE8CBCB3-701F-4FB8-BB03-A29050769D39}"/>
+              </a:ext>
+            </a:extLst>
+          </p:cNvPr>
+          <p:cNvSpPr txBox="1"/>
+          <p:nvPr/>
+        </p:nvSpPr>
+        <p:spPr>
+          <a:xfrm>
+            <a:off x="1844772" y="3222855"/>
+            <a:ext cx="262122" cy="276999"/>
+          </a:xfrm>
+          <a:prstGeom prst="rect">
+            <a:avLst/>
+          </a:prstGeom>
+          <a:solidFill>
+            <a:schemeClr val="bg1"/>
+          </a:solidFill>
+          <a:ln>
+            <a:solidFill>
+              <a:srgbClr val="FF0000"/>
+            </a:solidFill>
+          </a:ln>
+        </p:spPr>
+        <p:txBody>
+          <a:bodyPr wrap="square" rtlCol="0">
+            <a:spAutoFit/>
+          </a:bodyPr>
+          <a:lstStyle/>
+          <a:p>
+            <a:r>
+              <a:rPr lang="de-DE" sz="1200" dirty="0"/>
+              <a:t>x</a:t>
+            </a:r>
+          </a:p>
+        </p:txBody>
+      </p:sp>
+      <p:sp>
+        <p:nvSpPr>
+          <p:cNvPr id="59" name="Textfeld 58">
+            <a:extLst>
+              <a:ext uri="{FF2B5EF4-FFF2-40B4-BE49-F238E27FC236}">
+                <a16:creationId xmlns:a16="http://schemas.microsoft.com/office/drawing/2014/main" id="{CC7C739F-0EC5-4DE3-8B9A-E3334E64CCBA}"/>
+              </a:ext>
+            </a:extLst>
+          </p:cNvPr>
+          <p:cNvSpPr txBox="1"/>
+          <p:nvPr/>
+        </p:nvSpPr>
+        <p:spPr>
+          <a:xfrm>
+            <a:off x="2308338" y="3742894"/>
+            <a:ext cx="234884" cy="276999"/>
+          </a:xfrm>
+          <a:prstGeom prst="rect">
+            <a:avLst/>
+          </a:prstGeom>
+          <a:solidFill>
+            <a:schemeClr val="bg1"/>
+          </a:solidFill>
+          <a:ln>
+            <a:solidFill>
+              <a:srgbClr val="FF0000"/>
+            </a:solidFill>
+          </a:ln>
+        </p:spPr>
+        <p:txBody>
+          <a:bodyPr wrap="square" rtlCol="0">
+            <a:spAutoFit/>
+          </a:bodyPr>
+          <a:lstStyle/>
+          <a:p>
+            <a:r>
+              <a:rPr lang="de-DE" sz="1200" dirty="0"/>
+              <a:t>y</a:t>
+            </a:r>
+          </a:p>
+        </p:txBody>
+      </p:sp>
+      <p:sp>
+        <p:nvSpPr>
+          <p:cNvPr id="60" name="Textfeld 59">
+            <a:extLst>
+              <a:ext uri="{FF2B5EF4-FFF2-40B4-BE49-F238E27FC236}">
+                <a16:creationId xmlns:a16="http://schemas.microsoft.com/office/drawing/2014/main" id="{9D24D0C4-EB45-493A-BD9F-85D4AD349520}"/>
+              </a:ext>
+            </a:extLst>
+          </p:cNvPr>
+          <p:cNvSpPr txBox="1"/>
+          <p:nvPr/>
+        </p:nvSpPr>
+        <p:spPr>
+          <a:xfrm>
+            <a:off x="3226307" y="2352691"/>
+            <a:ext cx="678690" cy="276999"/>
+          </a:xfrm>
+          <a:prstGeom prst="rect">
+            <a:avLst/>
+          </a:prstGeom>
+          <a:solidFill>
+            <a:schemeClr val="bg1"/>
+          </a:solidFill>
+          <a:ln>
+            <a:solidFill>
+              <a:srgbClr val="FF0000"/>
+            </a:solidFill>
+          </a:ln>
+        </p:spPr>
+        <p:txBody>
+          <a:bodyPr wrap="square" rtlCol="0">
+            <a:spAutoFit/>
+          </a:bodyPr>
+          <a:lstStyle/>
+          <a:p>
+            <a:r>
+              <a:rPr lang="de-DE" sz="1200" dirty="0" err="1"/>
+              <a:t>gamma</a:t>
+            </a:r>
+            <a:endParaRPr lang="de-DE" sz="1200" dirty="0"/>
+          </a:p>
+        </p:txBody>
+      </p:sp>
+      <p:pic>
+        <p:nvPicPr>
+          <p:cNvPr id="61" name="Grafik 60">
+            <a:extLst>
+              <a:ext uri="{FF2B5EF4-FFF2-40B4-BE49-F238E27FC236}">
+                <a16:creationId xmlns:a16="http://schemas.microsoft.com/office/drawing/2014/main" id="{31DEA79A-BC72-41F3-B346-7167BE06917D}"/>
+              </a:ext>
+            </a:extLst>
+          </p:cNvPr>
+          <p:cNvPicPr>
+            <a:picLocks noChangeAspect="1"/>
+          </p:cNvPicPr>
+          <p:nvPr/>
+        </p:nvPicPr>
+        <p:blipFill>
+          <a:blip r:embed="rId3"/>
+          <a:stretch>
+            <a:fillRect/>
+          </a:stretch>
+        </p:blipFill>
+        <p:spPr>
+          <a:xfrm rot="13201231">
+            <a:off x="2988839" y="3424627"/>
+            <a:ext cx="780356" cy="701101"/>
+          </a:xfrm>
+          <a:prstGeom prst="rect">
+            <a:avLst/>
+          </a:prstGeom>
+        </p:spPr>
+      </p:pic>
+      <p:sp>
+        <p:nvSpPr>
+          <p:cNvPr id="62" name="Textfeld 61">
+            <a:extLst>
+              <a:ext uri="{FF2B5EF4-FFF2-40B4-BE49-F238E27FC236}">
+                <a16:creationId xmlns:a16="http://schemas.microsoft.com/office/drawing/2014/main" id="{7A928CAD-97A3-4B21-AFCA-45AF36D8BDBD}"/>
+              </a:ext>
+            </a:extLst>
+          </p:cNvPr>
+          <p:cNvSpPr txBox="1"/>
+          <p:nvPr/>
+        </p:nvSpPr>
+        <p:spPr>
+          <a:xfrm>
+            <a:off x="3118523" y="3890452"/>
+            <a:ext cx="576942" cy="276999"/>
+          </a:xfrm>
+          <a:prstGeom prst="rect">
+            <a:avLst/>
+          </a:prstGeom>
+          <a:solidFill>
+            <a:schemeClr val="bg1"/>
+          </a:solidFill>
+          <a:ln>
+            <a:solidFill>
+              <a:srgbClr val="FF0000"/>
+            </a:solidFill>
+          </a:ln>
+        </p:spPr>
+        <p:txBody>
+          <a:bodyPr wrap="square" rtlCol="0">
+            <a:spAutoFit/>
+          </a:bodyPr>
+          <a:lstStyle/>
+          <a:p>
+            <a:r>
+              <a:rPr lang="de-DE" sz="1200" dirty="0" err="1"/>
+              <a:t>beta</a:t>
+            </a:r>
+            <a:endParaRPr lang="de-DE" sz="1200" dirty="0"/>
+          </a:p>
+        </p:txBody>
+      </p:sp>
+      <p:sp>
+        <p:nvSpPr>
+          <p:cNvPr id="63" name="Textfeld 62">
+            <a:extLst>
+              <a:ext uri="{FF2B5EF4-FFF2-40B4-BE49-F238E27FC236}">
+                <a16:creationId xmlns:a16="http://schemas.microsoft.com/office/drawing/2014/main" id="{B304446C-FD1A-459D-9B74-81970F9AA406}"/>
+              </a:ext>
+            </a:extLst>
+          </p:cNvPr>
+          <p:cNvSpPr txBox="1"/>
+          <p:nvPr/>
+        </p:nvSpPr>
+        <p:spPr>
+          <a:xfrm>
+            <a:off x="1441124" y="2491190"/>
+            <a:ext cx="569929" cy="276999"/>
+          </a:xfrm>
+          <a:prstGeom prst="rect">
+            <a:avLst/>
+          </a:prstGeom>
+          <a:solidFill>
+            <a:schemeClr val="bg1"/>
+          </a:solidFill>
+          <a:ln>
+            <a:solidFill>
+              <a:srgbClr val="FF0000"/>
+            </a:solidFill>
+          </a:ln>
+        </p:spPr>
+        <p:txBody>
+          <a:bodyPr wrap="square" rtlCol="0">
+            <a:spAutoFit/>
+          </a:bodyPr>
+          <a:lstStyle/>
+          <a:p>
+            <a:r>
+              <a:rPr lang="de-DE" sz="1200" dirty="0" err="1"/>
+              <a:t>alpha</a:t>
+            </a:r>
+            <a:endParaRPr lang="de-DE" sz="1200" dirty="0"/>
+          </a:p>
+        </p:txBody>
+      </p:sp>
+      <p:pic>
+        <p:nvPicPr>
+          <p:cNvPr id="64" name="Grafik 63">
+            <a:extLst>
+              <a:ext uri="{FF2B5EF4-FFF2-40B4-BE49-F238E27FC236}">
+                <a16:creationId xmlns:a16="http://schemas.microsoft.com/office/drawing/2014/main" id="{A9851242-8380-474A-A3DA-643DA891E41E}"/>
+              </a:ext>
+            </a:extLst>
+          </p:cNvPr>
+          <p:cNvPicPr>
+            <a:picLocks noChangeAspect="1"/>
+          </p:cNvPicPr>
+          <p:nvPr/>
+        </p:nvPicPr>
+        <p:blipFill>
+          <a:blip r:embed="rId3"/>
+          <a:stretch>
+            <a:fillRect/>
+          </a:stretch>
+        </p:blipFill>
+        <p:spPr>
+          <a:xfrm rot="7816090">
+            <a:off x="1691918" y="2102246"/>
+            <a:ext cx="780356" cy="701101"/>
+          </a:xfrm>
+          <a:prstGeom prst="rect">
+            <a:avLst/>
+          </a:prstGeom>
+        </p:spPr>
+      </p:pic>
+      <p:cxnSp>
+        <p:nvCxnSpPr>
+          <p:cNvPr id="65" name="Gerade Verbindung mit Pfeil 64">
+            <a:extLst>
+              <a:ext uri="{FF2B5EF4-FFF2-40B4-BE49-F238E27FC236}">
+                <a16:creationId xmlns:a16="http://schemas.microsoft.com/office/drawing/2014/main" id="{A1DB1515-8DF6-4060-860B-B55F546887FC}"/>
+              </a:ext>
+            </a:extLst>
+          </p:cNvPr>
+          <p:cNvCxnSpPr>
+            <a:cxnSpLocks/>
+          </p:cNvCxnSpPr>
+          <p:nvPr/>
+        </p:nvCxnSpPr>
+        <p:spPr>
+          <a:xfrm flipV="1">
+            <a:off x="2087779" y="3167498"/>
+            <a:ext cx="539322" cy="572310"/>
+          </a:xfrm>
+          <a:prstGeom prst="straightConnector1">
+            <a:avLst/>
+          </a:prstGeom>
+          <a:ln w="57150">
+            <a:solidFill>
+              <a:srgbClr val="FF0000"/>
+            </a:solidFill>
+            <a:tailEnd type="triangle"/>
+          </a:ln>
+        </p:spPr>
+        <p:style>
+          <a:lnRef idx="1">
+            <a:schemeClr val="accent1"/>
+          </a:lnRef>
+          <a:fillRef idx="0">
+            <a:schemeClr val="accent1"/>
+          </a:fillRef>
+          <a:effectRef idx="0">
+            <a:schemeClr val="accent1"/>
+          </a:effectRef>
+          <a:fontRef idx="minor">
+            <a:schemeClr val="tx1"/>
+          </a:fontRef>
+        </p:style>
+      </p:cxnSp>
+      <p:sp>
+        <p:nvSpPr>
+          <p:cNvPr id="67" name="Textfeld 66">
+            <a:extLst>
+              <a:ext uri="{FF2B5EF4-FFF2-40B4-BE49-F238E27FC236}">
+                <a16:creationId xmlns:a16="http://schemas.microsoft.com/office/drawing/2014/main" id="{2367A14B-3C0A-42D5-9212-FD4AF28C67A1}"/>
+              </a:ext>
+            </a:extLst>
+          </p:cNvPr>
+          <p:cNvSpPr txBox="1"/>
+          <p:nvPr/>
+        </p:nvSpPr>
+        <p:spPr>
+          <a:xfrm>
+            <a:off x="2637760" y="3175767"/>
+            <a:ext cx="234884" cy="276999"/>
+          </a:xfrm>
+          <a:prstGeom prst="rect">
+            <a:avLst/>
+          </a:prstGeom>
+          <a:solidFill>
+            <a:schemeClr val="bg1"/>
+          </a:solidFill>
+          <a:ln>
+            <a:solidFill>
+              <a:srgbClr val="FF0000"/>
+            </a:solidFill>
+          </a:ln>
+        </p:spPr>
+        <p:txBody>
+          <a:bodyPr wrap="square" rtlCol="0">
+            <a:spAutoFit/>
+          </a:bodyPr>
+          <a:lstStyle/>
+          <a:p>
+            <a:r>
+              <a:rPr lang="de-DE" sz="1200" dirty="0"/>
+              <a:t>z</a:t>
+            </a:r>
+          </a:p>
+        </p:txBody>
+      </p:sp>
+      <p:sp>
+        <p:nvSpPr>
+          <p:cNvPr id="68" name="Textfeld 67">
+            <a:extLst>
+              <a:ext uri="{FF2B5EF4-FFF2-40B4-BE49-F238E27FC236}">
+                <a16:creationId xmlns:a16="http://schemas.microsoft.com/office/drawing/2014/main" id="{C2577F17-0527-4C68-A239-4588BE18F434}"/>
+              </a:ext>
+            </a:extLst>
+          </p:cNvPr>
+          <p:cNvSpPr txBox="1"/>
+          <p:nvPr/>
+        </p:nvSpPr>
+        <p:spPr>
+          <a:xfrm>
+            <a:off x="4385050" y="5460996"/>
+            <a:ext cx="1550916" cy="276999"/>
+          </a:xfrm>
+          <a:prstGeom prst="rect">
+            <a:avLst/>
+          </a:prstGeom>
+          <a:solidFill>
+            <a:schemeClr val="bg1"/>
+          </a:solidFill>
+          <a:ln>
+            <a:solidFill>
+              <a:srgbClr val="00B050"/>
+            </a:solidFill>
+          </a:ln>
+        </p:spPr>
+        <p:txBody>
+          <a:bodyPr wrap="square" rtlCol="0">
+            <a:spAutoFit/>
+          </a:bodyPr>
+          <a:lstStyle/>
+          <a:p>
+            <a:r>
+              <a:rPr lang="de-DE" sz="1200" dirty="0" err="1"/>
+              <a:t>Mz</a:t>
+            </a:r>
+            <a:r>
+              <a:rPr lang="de-DE" sz="1200" dirty="0"/>
+              <a:t>, </a:t>
+            </a:r>
+            <a:r>
+              <a:rPr lang="de-DE" sz="1200" dirty="0" err="1"/>
+              <a:t>Iz</a:t>
+            </a:r>
+            <a:r>
+              <a:rPr lang="de-DE" sz="1200" dirty="0"/>
+              <a:t>, </a:t>
+            </a:r>
+            <a:r>
+              <a:rPr lang="de-DE" sz="1200" dirty="0" err="1"/>
+              <a:t>Fz</a:t>
+            </a:r>
+            <a:r>
+              <a:rPr lang="de-DE" sz="1200" dirty="0"/>
+              <a:t>, </a:t>
+            </a:r>
+            <a:r>
+              <a:rPr lang="de-DE" sz="1200" dirty="0" err="1"/>
+              <a:t>Qz</a:t>
+            </a:r>
+            <a:endParaRPr lang="de-DE" sz="1200" dirty="0"/>
+          </a:p>
+        </p:txBody>
+      </p:sp>
+      <p:sp>
+        <p:nvSpPr>
+          <p:cNvPr id="69" name="Textfeld 68">
+            <a:extLst>
+              <a:ext uri="{FF2B5EF4-FFF2-40B4-BE49-F238E27FC236}">
+                <a16:creationId xmlns:a16="http://schemas.microsoft.com/office/drawing/2014/main" id="{E247FE66-6FFB-4CB2-8C62-4958F52DAB3B}"/>
+              </a:ext>
+            </a:extLst>
+          </p:cNvPr>
+          <p:cNvSpPr txBox="1"/>
+          <p:nvPr/>
+        </p:nvSpPr>
+        <p:spPr>
+          <a:xfrm>
+            <a:off x="4397080" y="6018055"/>
+            <a:ext cx="1538886" cy="276999"/>
+          </a:xfrm>
+          <a:prstGeom prst="rect">
+            <a:avLst/>
+          </a:prstGeom>
+          <a:solidFill>
+            <a:schemeClr val="bg1"/>
+          </a:solidFill>
+          <a:ln>
+            <a:solidFill>
+              <a:srgbClr val="00B050"/>
+            </a:solidFill>
+          </a:ln>
+        </p:spPr>
+        <p:txBody>
+          <a:bodyPr wrap="square" rtlCol="0">
+            <a:spAutoFit/>
+          </a:bodyPr>
+          <a:lstStyle/>
+          <a:p>
+            <a:r>
+              <a:rPr lang="de-DE" sz="1200" dirty="0" err="1"/>
+              <a:t>My</a:t>
+            </a:r>
+            <a:r>
+              <a:rPr lang="de-DE" sz="1200" dirty="0"/>
+              <a:t>, </a:t>
+            </a:r>
+            <a:r>
+              <a:rPr lang="de-DE" sz="1200" dirty="0" err="1"/>
+              <a:t>Iy</a:t>
+            </a:r>
+            <a:r>
+              <a:rPr lang="de-DE" sz="1200" dirty="0"/>
+              <a:t>, </a:t>
+            </a:r>
+            <a:r>
+              <a:rPr lang="de-DE" sz="1200" dirty="0" err="1"/>
+              <a:t>Fy</a:t>
+            </a:r>
+            <a:r>
+              <a:rPr lang="de-DE" sz="1200" dirty="0"/>
+              <a:t>, </a:t>
+            </a:r>
+            <a:r>
+              <a:rPr lang="de-DE" sz="1200" dirty="0" err="1"/>
+              <a:t>Qy</a:t>
+            </a:r>
+            <a:r>
+              <a:rPr lang="de-DE" sz="1200" dirty="0"/>
+              <a:t>, </a:t>
+            </a:r>
+            <a:r>
+              <a:rPr lang="de-DE" sz="1200" dirty="0" err="1"/>
+              <a:t>Sy</a:t>
+            </a:r>
+            <a:endParaRPr lang="de-DE" sz="1200" dirty="0"/>
+          </a:p>
+        </p:txBody>
+      </p:sp>
+      <p:sp>
+        <p:nvSpPr>
+          <p:cNvPr id="70" name="Textfeld 69">
+            <a:extLst>
+              <a:ext uri="{FF2B5EF4-FFF2-40B4-BE49-F238E27FC236}">
+                <a16:creationId xmlns:a16="http://schemas.microsoft.com/office/drawing/2014/main" id="{CD40EBEB-F568-4985-9EB1-9679661583F7}"/>
+              </a:ext>
+            </a:extLst>
+          </p:cNvPr>
+          <p:cNvSpPr txBox="1"/>
+          <p:nvPr/>
+        </p:nvSpPr>
+        <p:spPr>
+          <a:xfrm>
+            <a:off x="4385051" y="4948307"/>
+            <a:ext cx="1550916" cy="276999"/>
+          </a:xfrm>
+          <a:prstGeom prst="rect">
+            <a:avLst/>
+          </a:prstGeom>
+          <a:solidFill>
+            <a:schemeClr val="bg1"/>
+          </a:solidFill>
+          <a:ln>
+            <a:solidFill>
+              <a:srgbClr val="00B050"/>
+            </a:solidFill>
+          </a:ln>
+        </p:spPr>
+        <p:txBody>
+          <a:bodyPr wrap="square" rtlCol="0">
+            <a:spAutoFit/>
+          </a:bodyPr>
+          <a:lstStyle/>
+          <a:p>
+            <a:r>
+              <a:rPr lang="de-DE" sz="1200" dirty="0" err="1"/>
+              <a:t>Mx</a:t>
+            </a:r>
+            <a:r>
+              <a:rPr lang="de-DE" sz="1200" dirty="0"/>
+              <a:t>, </a:t>
+            </a:r>
+            <a:r>
+              <a:rPr lang="de-DE" sz="1200" dirty="0" err="1"/>
+              <a:t>It</a:t>
+            </a:r>
+            <a:r>
+              <a:rPr lang="de-DE" sz="1200" dirty="0"/>
+              <a:t>, </a:t>
+            </a:r>
+            <a:r>
+              <a:rPr lang="de-DE" sz="1200" dirty="0" err="1"/>
+              <a:t>Fx</a:t>
+            </a:r>
+            <a:r>
+              <a:rPr lang="de-DE" sz="1200" dirty="0"/>
+              <a:t>, </a:t>
+            </a:r>
+            <a:r>
+              <a:rPr lang="de-DE" sz="1200" dirty="0" err="1"/>
+              <a:t>Nx</a:t>
+            </a:r>
+            <a:r>
+              <a:rPr lang="de-DE" sz="1200" dirty="0"/>
+              <a:t>,</a:t>
+            </a:r>
+          </a:p>
+        </p:txBody>
+      </p:sp>
+      <p:sp>
+        <p:nvSpPr>
+          <p:cNvPr id="71" name="Textfeld 70">
+            <a:extLst>
+              <a:ext uri="{FF2B5EF4-FFF2-40B4-BE49-F238E27FC236}">
+                <a16:creationId xmlns:a16="http://schemas.microsoft.com/office/drawing/2014/main" id="{6FF2602C-F95C-4108-925B-34E3067C0494}"/>
+              </a:ext>
+            </a:extLst>
+          </p:cNvPr>
+          <p:cNvSpPr txBox="1"/>
+          <p:nvPr/>
+        </p:nvSpPr>
+        <p:spPr>
+          <a:xfrm>
+            <a:off x="7640340" y="5477145"/>
+            <a:ext cx="1388948" cy="276999"/>
+          </a:xfrm>
+          <a:prstGeom prst="rect">
+            <a:avLst/>
+          </a:prstGeom>
+          <a:solidFill>
+            <a:schemeClr val="bg1"/>
+          </a:solidFill>
+          <a:ln>
+            <a:solidFill>
+              <a:srgbClr val="00B050"/>
+            </a:solidFill>
+          </a:ln>
+        </p:spPr>
+        <p:txBody>
+          <a:bodyPr wrap="square" rtlCol="0">
+            <a:spAutoFit/>
+          </a:bodyPr>
+          <a:lstStyle/>
+          <a:p>
+            <a:r>
+              <a:rPr lang="de-DE" sz="1200" dirty="0" err="1"/>
+              <a:t>Mz</a:t>
+            </a:r>
+            <a:r>
+              <a:rPr lang="de-DE" sz="1200" dirty="0"/>
+              <a:t>, </a:t>
+            </a:r>
+            <a:r>
+              <a:rPr lang="de-DE" sz="1200" dirty="0" err="1"/>
+              <a:t>It</a:t>
+            </a:r>
+            <a:r>
+              <a:rPr lang="de-DE" sz="1200" dirty="0"/>
+              <a:t>, </a:t>
+            </a:r>
+            <a:r>
+              <a:rPr lang="de-DE" sz="1200" dirty="0" err="1"/>
+              <a:t>Fz</a:t>
+            </a:r>
+            <a:r>
+              <a:rPr lang="de-DE" sz="1200" dirty="0"/>
+              <a:t>, </a:t>
+            </a:r>
+            <a:r>
+              <a:rPr lang="de-DE" sz="1200" dirty="0" err="1"/>
+              <a:t>Nz</a:t>
+            </a:r>
+            <a:endParaRPr lang="de-DE" sz="1200" dirty="0"/>
+          </a:p>
+        </p:txBody>
+      </p:sp>
+      <p:sp>
+        <p:nvSpPr>
+          <p:cNvPr id="72" name="Pfeil: nach rechts 71">
+            <a:extLst>
+              <a:ext uri="{FF2B5EF4-FFF2-40B4-BE49-F238E27FC236}">
+                <a16:creationId xmlns:a16="http://schemas.microsoft.com/office/drawing/2014/main" id="{DC9709CE-6B65-4CB0-8043-97268559C741}"/>
+              </a:ext>
+            </a:extLst>
+          </p:cNvPr>
+          <p:cNvSpPr/>
+          <p:nvPr/>
+        </p:nvSpPr>
+        <p:spPr>
+          <a:xfrm>
+            <a:off x="130905" y="1894327"/>
+            <a:ext cx="697185" cy="464505"/>
+          </a:xfrm>
+          <a:prstGeom prst="rightArrow">
+            <a:avLst/>
+          </a:prstGeom>
+        </p:spPr>
+        <p:style>
+          <a:lnRef idx="2">
+            <a:schemeClr val="accent1">
+              <a:shade val="50000"/>
+            </a:schemeClr>
+          </a:lnRef>
+          <a:fillRef idx="1">
+            <a:schemeClr val="accent1"/>
+          </a:fillRef>
+          <a:effectRef idx="0">
+            <a:schemeClr val="accent1"/>
+          </a:effectRef>
+          <a:fontRef idx="minor">
+            <a:schemeClr val="lt1"/>
+          </a:fontRef>
+        </p:style>
+        <p:txBody>
+          <a:bodyPr rtlCol="0" anchor="ctr"/>
+          <a:lstStyle/>
+          <a:p>
+            <a:pPr algn="ctr"/>
+            <a:r>
+              <a:rPr lang="de-DE" sz="1400" dirty="0"/>
+              <a:t>Wind</a:t>
+            </a:r>
+          </a:p>
+        </p:txBody>
+      </p:sp>
+      <p:sp>
+        <p:nvSpPr>
+          <p:cNvPr id="73" name="Textfeld 72">
+            <a:extLst>
+              <a:ext uri="{FF2B5EF4-FFF2-40B4-BE49-F238E27FC236}">
+                <a16:creationId xmlns:a16="http://schemas.microsoft.com/office/drawing/2014/main" id="{0C5324B6-436D-4AD7-9AA2-F49E1C1DFF33}"/>
+              </a:ext>
+            </a:extLst>
+          </p:cNvPr>
+          <p:cNvSpPr txBox="1"/>
+          <p:nvPr/>
+        </p:nvSpPr>
+        <p:spPr>
+          <a:xfrm>
+            <a:off x="7535882" y="6018055"/>
+            <a:ext cx="1550916" cy="276999"/>
+          </a:xfrm>
+          <a:prstGeom prst="rect">
+            <a:avLst/>
+          </a:prstGeom>
+          <a:solidFill>
+            <a:schemeClr val="bg1"/>
+          </a:solidFill>
+          <a:ln>
+            <a:solidFill>
+              <a:srgbClr val="00B050"/>
+            </a:solidFill>
+          </a:ln>
+        </p:spPr>
+        <p:txBody>
+          <a:bodyPr wrap="square" rtlCol="0">
+            <a:spAutoFit/>
+          </a:bodyPr>
+          <a:lstStyle/>
+          <a:p>
+            <a:r>
+              <a:rPr lang="de-DE" sz="1200" dirty="0" err="1"/>
+              <a:t>My</a:t>
+            </a:r>
+            <a:r>
+              <a:rPr lang="de-DE" sz="1200" dirty="0"/>
+              <a:t>, </a:t>
+            </a:r>
+            <a:r>
+              <a:rPr lang="de-DE" sz="1200" dirty="0" err="1"/>
+              <a:t>Iy</a:t>
+            </a:r>
+            <a:r>
+              <a:rPr lang="de-DE" sz="1200" dirty="0"/>
+              <a:t>, </a:t>
+            </a:r>
+            <a:r>
+              <a:rPr lang="de-DE" sz="1200" dirty="0" err="1"/>
+              <a:t>Fy</a:t>
+            </a:r>
+            <a:r>
+              <a:rPr lang="de-DE" sz="1200" dirty="0"/>
+              <a:t>, </a:t>
+            </a:r>
+            <a:r>
+              <a:rPr lang="de-DE" sz="1200" dirty="0" err="1"/>
+              <a:t>Qy</a:t>
+            </a:r>
+            <a:endParaRPr lang="de-DE" sz="1200" dirty="0"/>
+          </a:p>
+        </p:txBody>
+      </p:sp>
+      <p:sp>
+        <p:nvSpPr>
+          <p:cNvPr id="74" name="Textfeld 73">
+            <a:extLst>
+              <a:ext uri="{FF2B5EF4-FFF2-40B4-BE49-F238E27FC236}">
+                <a16:creationId xmlns:a16="http://schemas.microsoft.com/office/drawing/2014/main" id="{448CAE64-761E-4954-B56C-08A42449E08D}"/>
+              </a:ext>
+            </a:extLst>
+          </p:cNvPr>
+          <p:cNvSpPr txBox="1"/>
+          <p:nvPr/>
+        </p:nvSpPr>
+        <p:spPr>
+          <a:xfrm>
+            <a:off x="7657121" y="4923553"/>
+            <a:ext cx="1372167" cy="276999"/>
+          </a:xfrm>
+          <a:prstGeom prst="rect">
+            <a:avLst/>
+          </a:prstGeom>
+          <a:solidFill>
+            <a:schemeClr val="bg1"/>
+          </a:solidFill>
+          <a:ln>
+            <a:solidFill>
+              <a:srgbClr val="00B050"/>
+            </a:solidFill>
+          </a:ln>
+        </p:spPr>
+        <p:txBody>
+          <a:bodyPr wrap="square" rtlCol="0">
+            <a:spAutoFit/>
+          </a:bodyPr>
+          <a:lstStyle/>
+          <a:p>
+            <a:r>
+              <a:rPr lang="de-DE" sz="1200" dirty="0" err="1"/>
+              <a:t>Mx</a:t>
+            </a:r>
+            <a:r>
+              <a:rPr lang="de-DE" sz="1200" dirty="0"/>
+              <a:t>, </a:t>
+            </a:r>
+            <a:r>
+              <a:rPr lang="de-DE" sz="1200" dirty="0" err="1"/>
+              <a:t>Ix</a:t>
+            </a:r>
+            <a:r>
+              <a:rPr lang="de-DE" sz="1200" dirty="0"/>
+              <a:t>, </a:t>
+            </a:r>
+            <a:r>
+              <a:rPr lang="de-DE" sz="1200" dirty="0" err="1"/>
+              <a:t>Fx</a:t>
+            </a:r>
+            <a:r>
+              <a:rPr lang="de-DE" sz="1200" dirty="0"/>
+              <a:t>, </a:t>
+            </a:r>
+            <a:r>
+              <a:rPr lang="de-DE" sz="1200" dirty="0" err="1"/>
+              <a:t>Qx</a:t>
+            </a:r>
+            <a:endParaRPr lang="de-DE" sz="1200" dirty="0"/>
+          </a:p>
+        </p:txBody>
+      </p:sp>
+      <p:cxnSp>
+        <p:nvCxnSpPr>
+          <p:cNvPr id="83" name="Gerade Verbindung mit Pfeil 82">
+            <a:extLst>
+              <a:ext uri="{FF2B5EF4-FFF2-40B4-BE49-F238E27FC236}">
+                <a16:creationId xmlns:a16="http://schemas.microsoft.com/office/drawing/2014/main" id="{D9B82109-E0BB-4B0B-AB1A-2E2814EAD8D2}"/>
+              </a:ext>
+            </a:extLst>
+          </p:cNvPr>
+          <p:cNvCxnSpPr>
+            <a:cxnSpLocks/>
+            <a:stCxn id="69" idx="3"/>
+            <a:endCxn id="73" idx="1"/>
+          </p:cNvCxnSpPr>
+          <p:nvPr/>
+        </p:nvCxnSpPr>
+        <p:spPr>
+          <a:xfrm>
+            <a:off x="5935966" y="6156555"/>
+            <a:ext cx="1599916" cy="0"/>
+          </a:xfrm>
+          <a:prstGeom prst="straightConnector1">
+            <a:avLst/>
+          </a:prstGeom>
+          <a:ln>
+            <a:tailEnd type="triangle"/>
+          </a:ln>
+        </p:spPr>
+        <p:style>
+          <a:lnRef idx="1">
+            <a:schemeClr val="accent1"/>
+          </a:lnRef>
+          <a:fillRef idx="0">
+            <a:schemeClr val="accent1"/>
+          </a:fillRef>
+          <a:effectRef idx="0">
+            <a:schemeClr val="accent1"/>
+          </a:effectRef>
+          <a:fontRef idx="minor">
+            <a:schemeClr val="tx1"/>
+          </a:fontRef>
+        </p:style>
+      </p:cxnSp>
+      <p:cxnSp>
+        <p:nvCxnSpPr>
+          <p:cNvPr id="85" name="Gerade Verbindung mit Pfeil 84">
+            <a:extLst>
+              <a:ext uri="{FF2B5EF4-FFF2-40B4-BE49-F238E27FC236}">
+                <a16:creationId xmlns:a16="http://schemas.microsoft.com/office/drawing/2014/main" id="{558BA919-3DFE-426C-BCE4-145503402C6B}"/>
+              </a:ext>
+            </a:extLst>
+          </p:cNvPr>
+          <p:cNvCxnSpPr>
+            <a:cxnSpLocks/>
+            <a:stCxn id="68" idx="3"/>
+            <a:endCxn id="71" idx="1"/>
+          </p:cNvCxnSpPr>
+          <p:nvPr/>
+        </p:nvCxnSpPr>
+        <p:spPr>
+          <a:xfrm>
+            <a:off x="5935966" y="5599496"/>
+            <a:ext cx="1704374" cy="16149"/>
+          </a:xfrm>
+          <a:prstGeom prst="straightConnector1">
+            <a:avLst/>
+          </a:prstGeom>
+          <a:ln>
+            <a:tailEnd type="triangle"/>
+          </a:ln>
+        </p:spPr>
+        <p:style>
+          <a:lnRef idx="1">
+            <a:schemeClr val="accent1"/>
+          </a:lnRef>
+          <a:fillRef idx="0">
+            <a:schemeClr val="accent1"/>
+          </a:fillRef>
+          <a:effectRef idx="0">
+            <a:schemeClr val="accent1"/>
+          </a:effectRef>
+          <a:fontRef idx="minor">
+            <a:schemeClr val="tx1"/>
+          </a:fontRef>
+        </p:style>
+      </p:cxnSp>
+      <p:cxnSp>
+        <p:nvCxnSpPr>
+          <p:cNvPr id="87" name="Gerade Verbindung mit Pfeil 86">
+            <a:extLst>
+              <a:ext uri="{FF2B5EF4-FFF2-40B4-BE49-F238E27FC236}">
+                <a16:creationId xmlns:a16="http://schemas.microsoft.com/office/drawing/2014/main" id="{8E71A821-BA08-4EA4-A373-E1E8771C8BD1}"/>
+              </a:ext>
+            </a:extLst>
+          </p:cNvPr>
+          <p:cNvCxnSpPr>
+            <a:cxnSpLocks/>
+            <a:stCxn id="70" idx="3"/>
+            <a:endCxn id="74" idx="1"/>
+          </p:cNvCxnSpPr>
+          <p:nvPr/>
+        </p:nvCxnSpPr>
+        <p:spPr>
+          <a:xfrm flipV="1">
+            <a:off x="5935967" y="5062053"/>
+            <a:ext cx="1721154" cy="24754"/>
+          </a:xfrm>
+          <a:prstGeom prst="straightConnector1">
+            <a:avLst/>
+          </a:prstGeom>
+          <a:ln>
+            <a:tailEnd type="triangle"/>
+          </a:ln>
+        </p:spPr>
+        <p:style>
+          <a:lnRef idx="1">
+            <a:schemeClr val="accent1"/>
+          </a:lnRef>
+          <a:fillRef idx="0">
+            <a:schemeClr val="accent1"/>
+          </a:fillRef>
+          <a:effectRef idx="0">
+            <a:schemeClr val="accent1"/>
+          </a:effectRef>
+          <a:fontRef idx="minor">
+            <a:schemeClr val="tx1"/>
+          </a:fontRef>
+        </p:style>
+      </p:cxnSp>
+      <p:sp>
+        <p:nvSpPr>
+          <p:cNvPr id="81" name="Textfeld 80">
+            <a:extLst>
+              <a:ext uri="{FF2B5EF4-FFF2-40B4-BE49-F238E27FC236}">
+                <a16:creationId xmlns:a16="http://schemas.microsoft.com/office/drawing/2014/main" id="{9D7165E1-1DE4-468A-AB5E-6738A7C55933}"/>
+              </a:ext>
+            </a:extLst>
+          </p:cNvPr>
+          <p:cNvSpPr txBox="1"/>
+          <p:nvPr/>
+        </p:nvSpPr>
+        <p:spPr>
+          <a:xfrm>
+            <a:off x="6268738" y="5498860"/>
+            <a:ext cx="1170723" cy="276999"/>
+          </a:xfrm>
+          <a:prstGeom prst="rect">
+            <a:avLst/>
+          </a:prstGeom>
+          <a:solidFill>
+            <a:schemeClr val="bg1"/>
+          </a:solidFill>
+          <a:ln>
+            <a:solidFill>
+              <a:schemeClr val="accent1"/>
+            </a:solidFill>
+          </a:ln>
+        </p:spPr>
+        <p:txBody>
+          <a:bodyPr wrap="square" rtlCol="0">
+            <a:spAutoFit/>
+          </a:bodyPr>
+          <a:lstStyle/>
+          <a:p>
+            <a:r>
+              <a:rPr lang="de-DE" sz="1200" dirty="0"/>
+              <a:t>Beam </a:t>
+            </a:r>
+            <a:r>
+              <a:rPr lang="de-DE" sz="1200" dirty="0">
+                <a:sym typeface="Wingdings" panose="05000000000000000000" pitchFamily="2" charset="2"/>
+              </a:rPr>
+              <a:t> Fast</a:t>
+            </a:r>
+            <a:endParaRPr lang="de-DE" sz="1200" dirty="0"/>
+          </a:p>
+        </p:txBody>
+      </p:sp>
+      <p:sp>
+        <p:nvSpPr>
+          <p:cNvPr id="76" name="Textfeld 75">
+            <a:extLst>
+              <a:ext uri="{FF2B5EF4-FFF2-40B4-BE49-F238E27FC236}">
+                <a16:creationId xmlns:a16="http://schemas.microsoft.com/office/drawing/2014/main" id="{9D784B13-C6B9-422B-9711-C1E41D6B846B}"/>
+              </a:ext>
+            </a:extLst>
+          </p:cNvPr>
+          <p:cNvSpPr txBox="1"/>
+          <p:nvPr/>
+        </p:nvSpPr>
+        <p:spPr>
+          <a:xfrm>
+            <a:off x="5381710" y="1334813"/>
+            <a:ext cx="262122" cy="276999"/>
+          </a:xfrm>
+          <a:prstGeom prst="rect">
+            <a:avLst/>
+          </a:prstGeom>
+          <a:solidFill>
+            <a:schemeClr val="bg1"/>
+          </a:solidFill>
+          <a:ln>
+            <a:solidFill>
+              <a:srgbClr val="FF0000"/>
+            </a:solidFill>
+          </a:ln>
+        </p:spPr>
+        <p:txBody>
+          <a:bodyPr wrap="square" rtlCol="0">
+            <a:spAutoFit/>
+          </a:bodyPr>
+          <a:lstStyle/>
+          <a:p>
+            <a:r>
+              <a:rPr lang="de-DE" sz="1200" dirty="0"/>
+              <a:t>x</a:t>
+            </a:r>
+          </a:p>
+        </p:txBody>
+      </p:sp>
+      <p:sp>
+        <p:nvSpPr>
+          <p:cNvPr id="77" name="Textfeld 76">
+            <a:extLst>
+              <a:ext uri="{FF2B5EF4-FFF2-40B4-BE49-F238E27FC236}">
+                <a16:creationId xmlns:a16="http://schemas.microsoft.com/office/drawing/2014/main" id="{2334B509-1A2B-4986-A1C7-CA24D3235C49}"/>
+              </a:ext>
+            </a:extLst>
+          </p:cNvPr>
+          <p:cNvSpPr txBox="1"/>
+          <p:nvPr/>
+        </p:nvSpPr>
+        <p:spPr>
+          <a:xfrm>
+            <a:off x="5393688" y="1778286"/>
+            <a:ext cx="234884" cy="276999"/>
+          </a:xfrm>
+          <a:prstGeom prst="rect">
+            <a:avLst/>
+          </a:prstGeom>
+          <a:solidFill>
+            <a:schemeClr val="bg1"/>
+          </a:solidFill>
+          <a:ln>
+            <a:solidFill>
+              <a:srgbClr val="FF0000"/>
+            </a:solidFill>
+          </a:ln>
+        </p:spPr>
+        <p:txBody>
+          <a:bodyPr wrap="square" rtlCol="0">
+            <a:spAutoFit/>
+          </a:bodyPr>
+          <a:lstStyle/>
+          <a:p>
+            <a:r>
+              <a:rPr lang="de-DE" sz="1200" dirty="0"/>
+              <a:t>y</a:t>
+            </a:r>
+          </a:p>
+        </p:txBody>
+      </p:sp>
+      <p:sp>
+        <p:nvSpPr>
+          <p:cNvPr id="78" name="Textfeld 77">
+            <a:extLst>
+              <a:ext uri="{FF2B5EF4-FFF2-40B4-BE49-F238E27FC236}">
+                <a16:creationId xmlns:a16="http://schemas.microsoft.com/office/drawing/2014/main" id="{2AE5C529-5346-4740-8E73-95223075298D}"/>
+              </a:ext>
+            </a:extLst>
+          </p:cNvPr>
+          <p:cNvSpPr txBox="1"/>
+          <p:nvPr/>
+        </p:nvSpPr>
+        <p:spPr>
+          <a:xfrm>
+            <a:off x="5239516" y="3291999"/>
+            <a:ext cx="678690" cy="276999"/>
+          </a:xfrm>
+          <a:prstGeom prst="rect">
+            <a:avLst/>
+          </a:prstGeom>
+          <a:solidFill>
+            <a:schemeClr val="bg1"/>
+          </a:solidFill>
+          <a:ln>
+            <a:solidFill>
+              <a:srgbClr val="FF0000"/>
+            </a:solidFill>
+          </a:ln>
+        </p:spPr>
+        <p:txBody>
+          <a:bodyPr wrap="square" rtlCol="0">
+            <a:spAutoFit/>
+          </a:bodyPr>
+          <a:lstStyle/>
+          <a:p>
+            <a:r>
+              <a:rPr lang="de-DE" sz="1200" dirty="0" err="1"/>
+              <a:t>gamma</a:t>
+            </a:r>
+            <a:endParaRPr lang="de-DE" sz="1200" dirty="0"/>
+          </a:p>
+        </p:txBody>
+      </p:sp>
+      <p:sp>
+        <p:nvSpPr>
+          <p:cNvPr id="79" name="Textfeld 78">
+            <a:extLst>
+              <a:ext uri="{FF2B5EF4-FFF2-40B4-BE49-F238E27FC236}">
+                <a16:creationId xmlns:a16="http://schemas.microsoft.com/office/drawing/2014/main" id="{07220DDF-9CD2-446A-82C0-BF3DB1EF044F}"/>
+              </a:ext>
+            </a:extLst>
+          </p:cNvPr>
+          <p:cNvSpPr txBox="1"/>
+          <p:nvPr/>
+        </p:nvSpPr>
+        <p:spPr>
+          <a:xfrm>
+            <a:off x="5246297" y="2953561"/>
+            <a:ext cx="576942" cy="276999"/>
+          </a:xfrm>
+          <a:prstGeom prst="rect">
+            <a:avLst/>
+          </a:prstGeom>
+          <a:solidFill>
+            <a:schemeClr val="bg1"/>
+          </a:solidFill>
+          <a:ln>
+            <a:solidFill>
+              <a:srgbClr val="FF0000"/>
+            </a:solidFill>
+          </a:ln>
+        </p:spPr>
+        <p:txBody>
+          <a:bodyPr wrap="square" rtlCol="0">
+            <a:spAutoFit/>
+          </a:bodyPr>
+          <a:lstStyle/>
+          <a:p>
+            <a:r>
+              <a:rPr lang="de-DE" sz="1200" dirty="0" err="1"/>
+              <a:t>beta</a:t>
+            </a:r>
+            <a:endParaRPr lang="de-DE" sz="1200" dirty="0"/>
+          </a:p>
+        </p:txBody>
+      </p:sp>
+      <p:sp>
+        <p:nvSpPr>
+          <p:cNvPr id="80" name="Textfeld 79">
+            <a:extLst>
+              <a:ext uri="{FF2B5EF4-FFF2-40B4-BE49-F238E27FC236}">
+                <a16:creationId xmlns:a16="http://schemas.microsoft.com/office/drawing/2014/main" id="{CF19AA6D-67B4-4266-A700-4DF9A3710C3D}"/>
+              </a:ext>
+            </a:extLst>
+          </p:cNvPr>
+          <p:cNvSpPr txBox="1"/>
+          <p:nvPr/>
+        </p:nvSpPr>
+        <p:spPr>
+          <a:xfrm>
+            <a:off x="5249803" y="2619943"/>
+            <a:ext cx="569929" cy="276999"/>
+          </a:xfrm>
+          <a:prstGeom prst="rect">
+            <a:avLst/>
+          </a:prstGeom>
+          <a:solidFill>
+            <a:schemeClr val="bg1"/>
+          </a:solidFill>
+          <a:ln>
+            <a:solidFill>
+              <a:srgbClr val="FF0000"/>
+            </a:solidFill>
+          </a:ln>
+        </p:spPr>
+        <p:txBody>
+          <a:bodyPr wrap="square" rtlCol="0">
+            <a:spAutoFit/>
+          </a:bodyPr>
+          <a:lstStyle/>
+          <a:p>
+            <a:r>
+              <a:rPr lang="de-DE" sz="1200" dirty="0" err="1"/>
+              <a:t>alpha</a:t>
+            </a:r>
+            <a:endParaRPr lang="de-DE" sz="1200" dirty="0"/>
+          </a:p>
+        </p:txBody>
+      </p:sp>
+      <p:sp>
+        <p:nvSpPr>
+          <p:cNvPr id="82" name="Textfeld 81">
+            <a:extLst>
+              <a:ext uri="{FF2B5EF4-FFF2-40B4-BE49-F238E27FC236}">
+                <a16:creationId xmlns:a16="http://schemas.microsoft.com/office/drawing/2014/main" id="{BFCB240E-61BA-4895-9C90-0BF9C0C414A4}"/>
+              </a:ext>
+            </a:extLst>
+          </p:cNvPr>
+          <p:cNvSpPr txBox="1"/>
+          <p:nvPr/>
+        </p:nvSpPr>
+        <p:spPr>
+          <a:xfrm>
+            <a:off x="5393688" y="2145369"/>
+            <a:ext cx="234884" cy="276999"/>
+          </a:xfrm>
+          <a:prstGeom prst="rect">
+            <a:avLst/>
+          </a:prstGeom>
+          <a:solidFill>
+            <a:schemeClr val="bg1"/>
+          </a:solidFill>
+          <a:ln>
+            <a:solidFill>
+              <a:srgbClr val="FF0000"/>
+            </a:solidFill>
+          </a:ln>
+        </p:spPr>
+        <p:txBody>
+          <a:bodyPr wrap="square" rtlCol="0">
+            <a:spAutoFit/>
+          </a:bodyPr>
+          <a:lstStyle/>
+          <a:p>
+            <a:r>
+              <a:rPr lang="de-DE" sz="1200" dirty="0"/>
+              <a:t>z</a:t>
+            </a:r>
+          </a:p>
+        </p:txBody>
+      </p:sp>
+      <p:sp>
+        <p:nvSpPr>
+          <p:cNvPr id="84" name="Textfeld 83">
+            <a:extLst>
+              <a:ext uri="{FF2B5EF4-FFF2-40B4-BE49-F238E27FC236}">
+                <a16:creationId xmlns:a16="http://schemas.microsoft.com/office/drawing/2014/main" id="{4836947A-2CE2-4765-BCE2-4EB4DF669A52}"/>
+              </a:ext>
+            </a:extLst>
+          </p:cNvPr>
+          <p:cNvSpPr txBox="1"/>
+          <p:nvPr/>
+        </p:nvSpPr>
+        <p:spPr>
+          <a:xfrm>
+            <a:off x="6941236" y="1671328"/>
+            <a:ext cx="662609" cy="276999"/>
+          </a:xfrm>
+          <a:prstGeom prst="rect">
+            <a:avLst/>
+          </a:prstGeom>
+          <a:solidFill>
+            <a:schemeClr val="bg1"/>
+          </a:solidFill>
+          <a:ln>
+            <a:solidFill>
+              <a:srgbClr val="FF0000"/>
+            </a:solidFill>
+          </a:ln>
+        </p:spPr>
+        <p:txBody>
+          <a:bodyPr wrap="square" rtlCol="0">
+            <a:spAutoFit/>
+          </a:bodyPr>
+          <a:lstStyle/>
+          <a:p>
+            <a:r>
+              <a:rPr lang="de-DE" sz="1200" dirty="0" err="1"/>
+              <a:t>Fx</a:t>
+            </a:r>
+            <a:r>
+              <a:rPr lang="de-DE" sz="1200" dirty="0"/>
+              <a:t>, </a:t>
+            </a:r>
+            <a:r>
+              <a:rPr lang="de-DE" sz="1200" dirty="0" err="1"/>
+              <a:t>Qx</a:t>
+            </a:r>
+            <a:endParaRPr lang="de-DE" sz="1200" dirty="0"/>
+          </a:p>
+        </p:txBody>
+      </p:sp>
+      <p:sp>
+        <p:nvSpPr>
+          <p:cNvPr id="86" name="Textfeld 85">
+            <a:extLst>
+              <a:ext uri="{FF2B5EF4-FFF2-40B4-BE49-F238E27FC236}">
+                <a16:creationId xmlns:a16="http://schemas.microsoft.com/office/drawing/2014/main" id="{9BB3ED09-9CD2-4E76-9412-9CAA4AABA504}"/>
+              </a:ext>
+            </a:extLst>
+          </p:cNvPr>
+          <p:cNvSpPr txBox="1"/>
+          <p:nvPr/>
+        </p:nvSpPr>
+        <p:spPr>
+          <a:xfrm>
+            <a:off x="6957999" y="2167648"/>
+            <a:ext cx="593755" cy="276999"/>
+          </a:xfrm>
+          <a:prstGeom prst="rect">
+            <a:avLst/>
+          </a:prstGeom>
+          <a:solidFill>
+            <a:schemeClr val="bg1"/>
+          </a:solidFill>
+          <a:ln>
+            <a:solidFill>
+              <a:srgbClr val="FF0000"/>
+            </a:solidFill>
+          </a:ln>
+        </p:spPr>
+        <p:txBody>
+          <a:bodyPr wrap="square" rtlCol="0">
+            <a:spAutoFit/>
+          </a:bodyPr>
+          <a:lstStyle/>
+          <a:p>
+            <a:r>
+              <a:rPr lang="de-DE" sz="1200" dirty="0" err="1"/>
+              <a:t>Fy</a:t>
+            </a:r>
+            <a:r>
+              <a:rPr lang="de-DE" sz="1200" dirty="0"/>
+              <a:t>, </a:t>
+            </a:r>
+            <a:r>
+              <a:rPr lang="de-DE" sz="1200" dirty="0" err="1"/>
+              <a:t>Qy</a:t>
+            </a:r>
+            <a:endParaRPr lang="de-DE" sz="1200" dirty="0"/>
+          </a:p>
+        </p:txBody>
+      </p:sp>
+      <p:sp>
+        <p:nvSpPr>
+          <p:cNvPr id="88" name="Textfeld 87">
+            <a:extLst>
+              <a:ext uri="{FF2B5EF4-FFF2-40B4-BE49-F238E27FC236}">
+                <a16:creationId xmlns:a16="http://schemas.microsoft.com/office/drawing/2014/main" id="{85F27453-3D22-4A9A-A854-A947127EF8A2}"/>
+              </a:ext>
+            </a:extLst>
+          </p:cNvPr>
+          <p:cNvSpPr txBox="1"/>
+          <p:nvPr/>
+        </p:nvSpPr>
+        <p:spPr>
+          <a:xfrm>
+            <a:off x="6711315" y="2633057"/>
+            <a:ext cx="1196582" cy="276999"/>
+          </a:xfrm>
+          <a:prstGeom prst="rect">
+            <a:avLst/>
+          </a:prstGeom>
+          <a:solidFill>
+            <a:schemeClr val="bg1"/>
+          </a:solidFill>
+          <a:ln>
+            <a:solidFill>
+              <a:srgbClr val="FF0000"/>
+            </a:solidFill>
+          </a:ln>
+        </p:spPr>
+        <p:txBody>
+          <a:bodyPr wrap="square" rtlCol="0">
+            <a:spAutoFit/>
+          </a:bodyPr>
+          <a:lstStyle/>
+          <a:p>
+            <a:r>
+              <a:rPr lang="de-DE" sz="1200" dirty="0" err="1"/>
+              <a:t>Mz</a:t>
+            </a:r>
+            <a:r>
+              <a:rPr lang="de-DE" sz="1200" dirty="0"/>
+              <a:t>, Torsion</a:t>
+            </a:r>
+          </a:p>
+        </p:txBody>
+      </p:sp>
+      <p:sp>
+        <p:nvSpPr>
+          <p:cNvPr id="89" name="Textfeld 88">
+            <a:extLst>
+              <a:ext uri="{FF2B5EF4-FFF2-40B4-BE49-F238E27FC236}">
+                <a16:creationId xmlns:a16="http://schemas.microsoft.com/office/drawing/2014/main" id="{2AD17D1F-AD85-4903-9132-81EFF1254BBE}"/>
+              </a:ext>
+            </a:extLst>
+          </p:cNvPr>
+          <p:cNvSpPr txBox="1"/>
+          <p:nvPr/>
+        </p:nvSpPr>
+        <p:spPr>
+          <a:xfrm>
+            <a:off x="6711315" y="3357656"/>
+            <a:ext cx="2260838" cy="276999"/>
+          </a:xfrm>
+          <a:prstGeom prst="rect">
+            <a:avLst/>
+          </a:prstGeom>
+          <a:solidFill>
+            <a:schemeClr val="bg1"/>
+          </a:solidFill>
+          <a:ln>
+            <a:solidFill>
+              <a:srgbClr val="FF0000"/>
+            </a:solidFill>
+          </a:ln>
+        </p:spPr>
+        <p:txBody>
+          <a:bodyPr wrap="square" rtlCol="0">
+            <a:spAutoFit/>
+          </a:bodyPr>
+          <a:lstStyle/>
+          <a:p>
+            <a:r>
+              <a:rPr lang="de-DE" sz="1200" dirty="0" err="1"/>
+              <a:t>My</a:t>
+            </a:r>
+            <a:r>
+              <a:rPr lang="de-DE" sz="1200" dirty="0"/>
+              <a:t>, Biegung in </a:t>
+            </a:r>
+            <a:r>
+              <a:rPr lang="de-DE" sz="1200" dirty="0" err="1"/>
+              <a:t>windrichtung</a:t>
+            </a:r>
+            <a:endParaRPr lang="de-DE" sz="1200" dirty="0"/>
+          </a:p>
+        </p:txBody>
+      </p:sp>
+      <p:sp>
+        <p:nvSpPr>
+          <p:cNvPr id="90" name="Textfeld 89">
+            <a:extLst>
+              <a:ext uri="{FF2B5EF4-FFF2-40B4-BE49-F238E27FC236}">
+                <a16:creationId xmlns:a16="http://schemas.microsoft.com/office/drawing/2014/main" id="{4F939B3D-712B-4E73-AC2F-656AD281AF85}"/>
+              </a:ext>
+            </a:extLst>
+          </p:cNvPr>
+          <p:cNvSpPr txBox="1"/>
+          <p:nvPr/>
+        </p:nvSpPr>
+        <p:spPr>
+          <a:xfrm>
+            <a:off x="6711315" y="2980836"/>
+            <a:ext cx="2126474" cy="276999"/>
+          </a:xfrm>
+          <a:prstGeom prst="rect">
+            <a:avLst/>
+          </a:prstGeom>
+          <a:solidFill>
+            <a:schemeClr val="bg1"/>
+          </a:solidFill>
+          <a:ln>
+            <a:solidFill>
+              <a:srgbClr val="FF0000"/>
+            </a:solidFill>
+          </a:ln>
+        </p:spPr>
+        <p:txBody>
+          <a:bodyPr wrap="square" rtlCol="0">
+            <a:spAutoFit/>
+          </a:bodyPr>
+          <a:lstStyle/>
+          <a:p>
+            <a:r>
+              <a:rPr lang="de-DE" sz="1200" dirty="0" err="1"/>
+              <a:t>Mx</a:t>
+            </a:r>
+            <a:r>
+              <a:rPr lang="de-DE" sz="1200" dirty="0"/>
+              <a:t>, Biegung quer zum wind</a:t>
+            </a:r>
+          </a:p>
+        </p:txBody>
+      </p:sp>
+      <p:sp>
+        <p:nvSpPr>
+          <p:cNvPr id="91" name="Textfeld 90">
+            <a:extLst>
+              <a:ext uri="{FF2B5EF4-FFF2-40B4-BE49-F238E27FC236}">
+                <a16:creationId xmlns:a16="http://schemas.microsoft.com/office/drawing/2014/main" id="{E0F930C7-50C6-4CFF-9FC2-3388F7CBDEB6}"/>
+              </a:ext>
+            </a:extLst>
+          </p:cNvPr>
+          <p:cNvSpPr txBox="1"/>
+          <p:nvPr/>
+        </p:nvSpPr>
+        <p:spPr>
+          <a:xfrm>
+            <a:off x="6929399" y="1165745"/>
+            <a:ext cx="650330" cy="276999"/>
+          </a:xfrm>
+          <a:prstGeom prst="rect">
+            <a:avLst/>
+          </a:prstGeom>
+          <a:solidFill>
+            <a:schemeClr val="bg1"/>
+          </a:solidFill>
+          <a:ln>
+            <a:solidFill>
+              <a:srgbClr val="FF0000"/>
+            </a:solidFill>
+          </a:ln>
+        </p:spPr>
+        <p:txBody>
+          <a:bodyPr wrap="square" rtlCol="0">
+            <a:spAutoFit/>
+          </a:bodyPr>
+          <a:lstStyle/>
+          <a:p>
+            <a:r>
+              <a:rPr lang="de-DE" sz="1200" dirty="0" err="1"/>
+              <a:t>Fz</a:t>
+            </a:r>
+            <a:r>
+              <a:rPr lang="de-DE" sz="1200" dirty="0"/>
+              <a:t>, </a:t>
+            </a:r>
+            <a:r>
+              <a:rPr lang="de-DE" sz="1200" dirty="0" err="1"/>
+              <a:t>Nz</a:t>
+            </a:r>
+            <a:endParaRPr lang="de-DE" sz="1200" dirty="0"/>
+          </a:p>
+        </p:txBody>
+      </p:sp>
+      <p:cxnSp>
+        <p:nvCxnSpPr>
+          <p:cNvPr id="44" name="Gerade Verbindung mit Pfeil 43">
+            <a:extLst>
+              <a:ext uri="{FF2B5EF4-FFF2-40B4-BE49-F238E27FC236}">
+                <a16:creationId xmlns:a16="http://schemas.microsoft.com/office/drawing/2014/main" id="{6CA8D2F7-BA13-4695-A2B8-E78C5D41DD50}"/>
+              </a:ext>
+            </a:extLst>
+          </p:cNvPr>
+          <p:cNvCxnSpPr>
+            <a:cxnSpLocks/>
+            <a:stCxn id="76" idx="3"/>
+            <a:endCxn id="91" idx="1"/>
+          </p:cNvCxnSpPr>
+          <p:nvPr/>
+        </p:nvCxnSpPr>
+        <p:spPr>
+          <a:xfrm flipV="1">
+            <a:off x="5643832" y="1304245"/>
+            <a:ext cx="1285567" cy="169068"/>
+          </a:xfrm>
+          <a:prstGeom prst="straightConnector1">
+            <a:avLst/>
+          </a:prstGeom>
+          <a:ln>
+            <a:tailEnd type="triangle"/>
+          </a:ln>
+        </p:spPr>
+        <p:style>
+          <a:lnRef idx="1">
+            <a:schemeClr val="accent1"/>
+          </a:lnRef>
+          <a:fillRef idx="0">
+            <a:schemeClr val="accent1"/>
+          </a:fillRef>
+          <a:effectRef idx="0">
+            <a:schemeClr val="accent1"/>
+          </a:effectRef>
+          <a:fontRef idx="minor">
+            <a:schemeClr val="tx1"/>
+          </a:fontRef>
+        </p:style>
+      </p:cxnSp>
+      <p:cxnSp>
+        <p:nvCxnSpPr>
+          <p:cNvPr id="75" name="Gerade Verbindung mit Pfeil 74">
+            <a:extLst>
+              <a:ext uri="{FF2B5EF4-FFF2-40B4-BE49-F238E27FC236}">
+                <a16:creationId xmlns:a16="http://schemas.microsoft.com/office/drawing/2014/main" id="{68708231-11A3-4489-B71A-2FAB94BC2585}"/>
+              </a:ext>
+            </a:extLst>
+          </p:cNvPr>
+          <p:cNvCxnSpPr>
+            <a:cxnSpLocks/>
+            <a:stCxn id="77" idx="3"/>
+            <a:endCxn id="84" idx="1"/>
+          </p:cNvCxnSpPr>
+          <p:nvPr/>
+        </p:nvCxnSpPr>
+        <p:spPr>
+          <a:xfrm flipV="1">
+            <a:off x="5628572" y="1809828"/>
+            <a:ext cx="1312664" cy="106958"/>
+          </a:xfrm>
+          <a:prstGeom prst="straightConnector1">
+            <a:avLst/>
+          </a:prstGeom>
+          <a:ln>
+            <a:tailEnd type="triangle"/>
+          </a:ln>
+        </p:spPr>
+        <p:style>
+          <a:lnRef idx="1">
+            <a:schemeClr val="accent1"/>
+          </a:lnRef>
+          <a:fillRef idx="0">
+            <a:schemeClr val="accent1"/>
+          </a:fillRef>
+          <a:effectRef idx="0">
+            <a:schemeClr val="accent1"/>
+          </a:effectRef>
+          <a:fontRef idx="minor">
+            <a:schemeClr val="tx1"/>
+          </a:fontRef>
+        </p:style>
+      </p:cxnSp>
+      <p:cxnSp>
+        <p:nvCxnSpPr>
+          <p:cNvPr id="93" name="Gerade Verbindung mit Pfeil 92">
+            <a:extLst>
+              <a:ext uri="{FF2B5EF4-FFF2-40B4-BE49-F238E27FC236}">
+                <a16:creationId xmlns:a16="http://schemas.microsoft.com/office/drawing/2014/main" id="{7BDBB3EB-259A-449E-A4F7-A68CD2A42FC0}"/>
+              </a:ext>
+            </a:extLst>
+          </p:cNvPr>
+          <p:cNvCxnSpPr>
+            <a:cxnSpLocks/>
+            <a:stCxn id="82" idx="3"/>
+            <a:endCxn id="86" idx="1"/>
+          </p:cNvCxnSpPr>
+          <p:nvPr/>
+        </p:nvCxnSpPr>
+        <p:spPr>
+          <a:xfrm>
+            <a:off x="5628572" y="2283869"/>
+            <a:ext cx="1329427" cy="22279"/>
+          </a:xfrm>
+          <a:prstGeom prst="straightConnector1">
+            <a:avLst/>
+          </a:prstGeom>
+          <a:ln>
+            <a:tailEnd type="triangle"/>
+          </a:ln>
+        </p:spPr>
+        <p:style>
+          <a:lnRef idx="1">
+            <a:schemeClr val="accent1"/>
+          </a:lnRef>
+          <a:fillRef idx="0">
+            <a:schemeClr val="accent1"/>
+          </a:fillRef>
+          <a:effectRef idx="0">
+            <a:schemeClr val="accent1"/>
+          </a:effectRef>
+          <a:fontRef idx="minor">
+            <a:schemeClr val="tx1"/>
+          </a:fontRef>
+        </p:style>
+      </p:cxnSp>
+      <p:cxnSp>
+        <p:nvCxnSpPr>
+          <p:cNvPr id="95" name="Gerade Verbindung mit Pfeil 94">
+            <a:extLst>
+              <a:ext uri="{FF2B5EF4-FFF2-40B4-BE49-F238E27FC236}">
+                <a16:creationId xmlns:a16="http://schemas.microsoft.com/office/drawing/2014/main" id="{FA30D6C1-3FD7-4BB2-9580-889A88B83CEB}"/>
+              </a:ext>
+            </a:extLst>
+          </p:cNvPr>
+          <p:cNvCxnSpPr>
+            <a:cxnSpLocks/>
+            <a:stCxn id="80" idx="3"/>
+            <a:endCxn id="88" idx="1"/>
+          </p:cNvCxnSpPr>
+          <p:nvPr/>
+        </p:nvCxnSpPr>
+        <p:spPr>
+          <a:xfrm>
+            <a:off x="5819732" y="2758443"/>
+            <a:ext cx="891583" cy="13114"/>
+          </a:xfrm>
+          <a:prstGeom prst="straightConnector1">
+            <a:avLst/>
+          </a:prstGeom>
+          <a:ln>
+            <a:tailEnd type="triangle"/>
+          </a:ln>
+        </p:spPr>
+        <p:style>
+          <a:lnRef idx="1">
+            <a:schemeClr val="accent1"/>
+          </a:lnRef>
+          <a:fillRef idx="0">
+            <a:schemeClr val="accent1"/>
+          </a:fillRef>
+          <a:effectRef idx="0">
+            <a:schemeClr val="accent1"/>
+          </a:effectRef>
+          <a:fontRef idx="minor">
+            <a:schemeClr val="tx1"/>
+          </a:fontRef>
+        </p:style>
+      </p:cxnSp>
+      <p:cxnSp>
+        <p:nvCxnSpPr>
+          <p:cNvPr id="97" name="Gerade Verbindung mit Pfeil 96">
+            <a:extLst>
+              <a:ext uri="{FF2B5EF4-FFF2-40B4-BE49-F238E27FC236}">
+                <a16:creationId xmlns:a16="http://schemas.microsoft.com/office/drawing/2014/main" id="{578E2996-8340-4C83-859E-5C86819B2F41}"/>
+              </a:ext>
+            </a:extLst>
+          </p:cNvPr>
+          <p:cNvCxnSpPr>
+            <a:cxnSpLocks/>
+            <a:stCxn id="79" idx="3"/>
+            <a:endCxn id="90" idx="1"/>
+          </p:cNvCxnSpPr>
+          <p:nvPr/>
+        </p:nvCxnSpPr>
+        <p:spPr>
+          <a:xfrm>
+            <a:off x="5823239" y="3092061"/>
+            <a:ext cx="888076" cy="27275"/>
+          </a:xfrm>
+          <a:prstGeom prst="straightConnector1">
+            <a:avLst/>
+          </a:prstGeom>
+          <a:ln>
+            <a:tailEnd type="triangle"/>
+          </a:ln>
+        </p:spPr>
+        <p:style>
+          <a:lnRef idx="1">
+            <a:schemeClr val="accent1"/>
+          </a:lnRef>
+          <a:fillRef idx="0">
+            <a:schemeClr val="accent1"/>
+          </a:fillRef>
+          <a:effectRef idx="0">
+            <a:schemeClr val="accent1"/>
+          </a:effectRef>
+          <a:fontRef idx="minor">
+            <a:schemeClr val="tx1"/>
+          </a:fontRef>
+        </p:style>
+      </p:cxnSp>
+      <p:cxnSp>
+        <p:nvCxnSpPr>
+          <p:cNvPr id="99" name="Gerade Verbindung mit Pfeil 98">
+            <a:extLst>
+              <a:ext uri="{FF2B5EF4-FFF2-40B4-BE49-F238E27FC236}">
+                <a16:creationId xmlns:a16="http://schemas.microsoft.com/office/drawing/2014/main" id="{848AB2AF-850D-428E-9F7B-C2F3DD144C43}"/>
+              </a:ext>
+            </a:extLst>
+          </p:cNvPr>
+          <p:cNvCxnSpPr>
+            <a:cxnSpLocks/>
+            <a:stCxn id="78" idx="3"/>
+            <a:endCxn id="89" idx="1"/>
+          </p:cNvCxnSpPr>
+          <p:nvPr/>
+        </p:nvCxnSpPr>
+        <p:spPr>
+          <a:xfrm>
+            <a:off x="5918206" y="3430499"/>
+            <a:ext cx="793109" cy="65657"/>
+          </a:xfrm>
+          <a:prstGeom prst="straightConnector1">
+            <a:avLst/>
+          </a:prstGeom>
+          <a:ln>
+            <a:tailEnd type="triangle"/>
+          </a:ln>
+        </p:spPr>
+        <p:style>
+          <a:lnRef idx="1">
+            <a:schemeClr val="accent1"/>
+          </a:lnRef>
+          <a:fillRef idx="0">
+            <a:schemeClr val="accent1"/>
+          </a:fillRef>
+          <a:effectRef idx="0">
+            <a:schemeClr val="accent1"/>
+          </a:effectRef>
+          <a:fontRef idx="minor">
+            <a:schemeClr val="tx1"/>
+          </a:fontRef>
+        </p:style>
+      </p:cxnSp>
+      <p:sp>
+        <p:nvSpPr>
+          <p:cNvPr id="103" name="Textfeld 102">
+            <a:extLst>
+              <a:ext uri="{FF2B5EF4-FFF2-40B4-BE49-F238E27FC236}">
+                <a16:creationId xmlns:a16="http://schemas.microsoft.com/office/drawing/2014/main" id="{96C5A476-3ABA-4EEE-AB5E-C6009313D7EF}"/>
+              </a:ext>
+            </a:extLst>
+          </p:cNvPr>
+          <p:cNvSpPr txBox="1"/>
+          <p:nvPr/>
+        </p:nvSpPr>
+        <p:spPr>
+          <a:xfrm>
+            <a:off x="4321927" y="386726"/>
+            <a:ext cx="4642165" cy="523220"/>
+          </a:xfrm>
+          <a:prstGeom prst="rect">
+            <a:avLst/>
+          </a:prstGeom>
+          <a:noFill/>
+          <a:ln w="28575">
+            <a:solidFill>
+              <a:srgbClr val="FF0000"/>
+            </a:solidFill>
+          </a:ln>
+        </p:spPr>
+        <p:txBody>
+          <a:bodyPr wrap="square" rtlCol="0">
+            <a:spAutoFit/>
+          </a:bodyPr>
+          <a:lstStyle/>
+          <a:p>
+            <a:r>
+              <a:rPr lang="de-DE" sz="1400" dirty="0"/>
+              <a:t>DOFs bleiben gleich aber die DOF Response/Kraft </a:t>
+            </a:r>
+            <a:r>
+              <a:rPr lang="de-DE" sz="1400" dirty="0" err="1"/>
+              <a:t>map</a:t>
+            </a:r>
+            <a:r>
+              <a:rPr lang="de-DE" sz="1400" dirty="0"/>
+              <a:t> wird geändert. </a:t>
+            </a:r>
+            <a:r>
+              <a:rPr lang="de-DE" sz="1400" dirty="0" err="1"/>
+              <a:t>Fz</a:t>
+            </a:r>
+            <a:r>
+              <a:rPr lang="de-DE" sz="1400" dirty="0"/>
+              <a:t> wirkt eben in x Richtung vom beam…</a:t>
+            </a:r>
+          </a:p>
+        </p:txBody>
+      </p:sp>
+      <p:sp>
+        <p:nvSpPr>
+          <p:cNvPr id="130" name="Textfeld 129">
+            <a:extLst>
+              <a:ext uri="{FF2B5EF4-FFF2-40B4-BE49-F238E27FC236}">
+                <a16:creationId xmlns:a16="http://schemas.microsoft.com/office/drawing/2014/main" id="{4E73326E-44AE-4423-85B5-F9E66925466B}"/>
+              </a:ext>
+            </a:extLst>
+          </p:cNvPr>
+          <p:cNvSpPr txBox="1"/>
+          <p:nvPr/>
+        </p:nvSpPr>
+        <p:spPr>
+          <a:xfrm>
+            <a:off x="4329988" y="4063050"/>
+            <a:ext cx="4642165" cy="738664"/>
+          </a:xfrm>
+          <a:prstGeom prst="rect">
+            <a:avLst/>
+          </a:prstGeom>
+          <a:noFill/>
+          <a:ln w="28575">
+            <a:solidFill>
+              <a:srgbClr val="00B050"/>
+            </a:solidFill>
+          </a:ln>
+        </p:spPr>
+        <p:txBody>
+          <a:bodyPr wrap="square" rtlCol="0">
+            <a:spAutoFit/>
+          </a:bodyPr>
+          <a:lstStyle/>
+          <a:p>
+            <a:r>
+              <a:rPr lang="de-DE" sz="1400" dirty="0"/>
+              <a:t>Kraft und Reaktionsbezeichnung sind im Beam also gleich wie in FAST. Die Querschnittswerte beziehen sich auch auf das Turm </a:t>
+            </a:r>
+            <a:r>
+              <a:rPr lang="de-DE" sz="1400" dirty="0" err="1"/>
+              <a:t>Kosy</a:t>
+            </a:r>
+            <a:endParaRPr lang="de-DE" sz="1400" dirty="0"/>
+          </a:p>
+        </p:txBody>
+      </p:sp>
+    </p:spTree>
+    <p:extLst>
+      <p:ext uri="{BB962C8B-B14F-4D97-AF65-F5344CB8AC3E}">
+        <p14:creationId xmlns:p14="http://schemas.microsoft.com/office/powerpoint/2010/main" val="1564355837"/>
+      </p:ext>
+    </p:extLst>
+  </p:cSld>
+  <p:clrMapOvr>
+    <a:masterClrMapping/>
+  </p:clrMapOvr>
+</p:sld>
+</file>
+
 <file path=ppt/theme/theme1.xml><?xml version="1.0" encoding="utf-8"?>
 <a:theme xmlns:a="http://schemas.openxmlformats.org/drawingml/2006/main" name="Office">
   <a:themeElements>

</xml_diff>

<commit_message>
update input params + Lasten WTN
</commit_message>
<xml_diff>
--- a/Übersicht_3DBeam.pptx
+++ b/Übersicht_3DBeam.pptx
@@ -8,6 +8,7 @@
     <p:sldId id="256" r:id="rId2"/>
     <p:sldId id="257" r:id="rId3"/>
     <p:sldId id="258" r:id="rId4"/>
+    <p:sldId id="259" r:id="rId5"/>
   </p:sldIdLst>
   <p:sldSz cx="12192000" cy="6858000"/>
   <p:notesSz cx="6858000" cy="9144000"/>
@@ -261,7 +262,7 @@
           <a:p>
             <a:fld id="{AC4F5CAE-E926-477B-8070-DB19FCEE5F45}" type="datetimeFigureOut">
               <a:rPr lang="de-DE" smtClean="0"/>
-              <a:t>15.02.2023</a:t>
+              <a:t>12.06.2023</a:t>
             </a:fld>
             <a:endParaRPr lang="de-DE"/>
           </a:p>
@@ -459,7 +460,7 @@
           <a:p>
             <a:fld id="{AC4F5CAE-E926-477B-8070-DB19FCEE5F45}" type="datetimeFigureOut">
               <a:rPr lang="de-DE" smtClean="0"/>
-              <a:t>15.02.2023</a:t>
+              <a:t>12.06.2023</a:t>
             </a:fld>
             <a:endParaRPr lang="de-DE"/>
           </a:p>
@@ -667,7 +668,7 @@
           <a:p>
             <a:fld id="{AC4F5CAE-E926-477B-8070-DB19FCEE5F45}" type="datetimeFigureOut">
               <a:rPr lang="de-DE" smtClean="0"/>
-              <a:t>15.02.2023</a:t>
+              <a:t>12.06.2023</a:t>
             </a:fld>
             <a:endParaRPr lang="de-DE"/>
           </a:p>
@@ -865,7 +866,7 @@
           <a:p>
             <a:fld id="{AC4F5CAE-E926-477B-8070-DB19FCEE5F45}" type="datetimeFigureOut">
               <a:rPr lang="de-DE" smtClean="0"/>
-              <a:t>15.02.2023</a:t>
+              <a:t>12.06.2023</a:t>
             </a:fld>
             <a:endParaRPr lang="de-DE"/>
           </a:p>
@@ -1140,7 +1141,7 @@
           <a:p>
             <a:fld id="{AC4F5CAE-E926-477B-8070-DB19FCEE5F45}" type="datetimeFigureOut">
               <a:rPr lang="de-DE" smtClean="0"/>
-              <a:t>15.02.2023</a:t>
+              <a:t>12.06.2023</a:t>
             </a:fld>
             <a:endParaRPr lang="de-DE"/>
           </a:p>
@@ -1405,7 +1406,7 @@
           <a:p>
             <a:fld id="{AC4F5CAE-E926-477B-8070-DB19FCEE5F45}" type="datetimeFigureOut">
               <a:rPr lang="de-DE" smtClean="0"/>
-              <a:t>15.02.2023</a:t>
+              <a:t>12.06.2023</a:t>
             </a:fld>
             <a:endParaRPr lang="de-DE"/>
           </a:p>
@@ -1817,7 +1818,7 @@
           <a:p>
             <a:fld id="{AC4F5CAE-E926-477B-8070-DB19FCEE5F45}" type="datetimeFigureOut">
               <a:rPr lang="de-DE" smtClean="0"/>
-              <a:t>15.02.2023</a:t>
+              <a:t>12.06.2023</a:t>
             </a:fld>
             <a:endParaRPr lang="de-DE"/>
           </a:p>
@@ -1958,7 +1959,7 @@
           <a:p>
             <a:fld id="{AC4F5CAE-E926-477B-8070-DB19FCEE5F45}" type="datetimeFigureOut">
               <a:rPr lang="de-DE" smtClean="0"/>
-              <a:t>15.02.2023</a:t>
+              <a:t>12.06.2023</a:t>
             </a:fld>
             <a:endParaRPr lang="de-DE"/>
           </a:p>
@@ -2071,7 +2072,7 @@
           <a:p>
             <a:fld id="{AC4F5CAE-E926-477B-8070-DB19FCEE5F45}" type="datetimeFigureOut">
               <a:rPr lang="de-DE" smtClean="0"/>
-              <a:t>15.02.2023</a:t>
+              <a:t>12.06.2023</a:t>
             </a:fld>
             <a:endParaRPr lang="de-DE"/>
           </a:p>
@@ -2382,7 +2383,7 @@
           <a:p>
             <a:fld id="{AC4F5CAE-E926-477B-8070-DB19FCEE5F45}" type="datetimeFigureOut">
               <a:rPr lang="de-DE" smtClean="0"/>
-              <a:t>15.02.2023</a:t>
+              <a:t>12.06.2023</a:t>
             </a:fld>
             <a:endParaRPr lang="de-DE"/>
           </a:p>
@@ -2670,7 +2671,7 @@
           <a:p>
             <a:fld id="{AC4F5CAE-E926-477B-8070-DB19FCEE5F45}" type="datetimeFigureOut">
               <a:rPr lang="de-DE" smtClean="0"/>
-              <a:t>15.02.2023</a:t>
+              <a:t>12.06.2023</a:t>
             </a:fld>
             <a:endParaRPr lang="de-DE"/>
           </a:p>
@@ -2911,7 +2912,7 @@
           <a:p>
             <a:fld id="{AC4F5CAE-E926-477B-8070-DB19FCEE5F45}" type="datetimeFigureOut">
               <a:rPr lang="de-DE" smtClean="0"/>
-              <a:t>15.02.2023</a:t>
+              <a:t>12.06.2023</a:t>
             </a:fld>
             <a:endParaRPr lang="de-DE"/>
           </a:p>
@@ -6327,6 +6328,445 @@
           </a:fontRef>
         </p:style>
       </p:cxnSp>
+      <p:grpSp>
+        <p:nvGrpSpPr>
+          <p:cNvPr id="10" name="Gruppieren 9">
+            <a:extLst>
+              <a:ext uri="{FF2B5EF4-FFF2-40B4-BE49-F238E27FC236}">
+                <a16:creationId xmlns:a16="http://schemas.microsoft.com/office/drawing/2014/main" id="{77026B9D-3389-8985-00E1-0E146E4A885C}"/>
+              </a:ext>
+            </a:extLst>
+          </p:cNvPr>
+          <p:cNvGrpSpPr/>
+          <p:nvPr/>
+        </p:nvGrpSpPr>
+        <p:grpSpPr>
+          <a:xfrm>
+            <a:off x="3332267" y="3588988"/>
+            <a:ext cx="1956362" cy="2993676"/>
+            <a:chOff x="3332267" y="3588988"/>
+            <a:chExt cx="1956362" cy="2993676"/>
+          </a:xfrm>
+        </p:grpSpPr>
+        <p:pic>
+          <p:nvPicPr>
+            <p:cNvPr id="4" name="Grafik 3">
+              <a:extLst>
+                <a:ext uri="{FF2B5EF4-FFF2-40B4-BE49-F238E27FC236}">
+                  <a16:creationId xmlns:a16="http://schemas.microsoft.com/office/drawing/2014/main" id="{08DC628C-D197-34AF-C745-909A5A5CD3B9}"/>
+                </a:ext>
+              </a:extLst>
+            </p:cNvPr>
+            <p:cNvPicPr>
+              <a:picLocks noChangeAspect="1"/>
+            </p:cNvPicPr>
+            <p:nvPr/>
+          </p:nvPicPr>
+          <p:blipFill>
+            <a:blip r:embed="rId2"/>
+            <a:stretch>
+              <a:fillRect/>
+            </a:stretch>
+          </p:blipFill>
+          <p:spPr>
+            <a:xfrm>
+              <a:off x="3332267" y="3588988"/>
+              <a:ext cx="1912311" cy="2993676"/>
+            </a:xfrm>
+            <a:prstGeom prst="rect">
+              <a:avLst/>
+            </a:prstGeom>
+          </p:spPr>
+        </p:pic>
+        <p:sp>
+          <p:nvSpPr>
+            <p:cNvPr id="5" name="Textfeld 4">
+              <a:extLst>
+                <a:ext uri="{FF2B5EF4-FFF2-40B4-BE49-F238E27FC236}">
+                  <a16:creationId xmlns:a16="http://schemas.microsoft.com/office/drawing/2014/main" id="{39A22BA6-7FCD-43EE-BE27-8F58A846C6CE}"/>
+                </a:ext>
+              </a:extLst>
+            </p:cNvPr>
+            <p:cNvSpPr txBox="1"/>
+            <p:nvPr/>
+          </p:nvSpPr>
+          <p:spPr>
+            <a:xfrm>
+              <a:off x="3973886" y="3597394"/>
+              <a:ext cx="571272" cy="261610"/>
+            </a:xfrm>
+            <a:prstGeom prst="rect">
+              <a:avLst/>
+            </a:prstGeom>
+            <a:solidFill>
+              <a:schemeClr val="bg1"/>
+            </a:solidFill>
+          </p:spPr>
+          <p:txBody>
+            <a:bodyPr wrap="square" rtlCol="0">
+              <a:spAutoFit/>
+            </a:bodyPr>
+            <a:lstStyle/>
+            <a:p>
+              <a:r>
+                <a:rPr lang="de-DE" sz="1100" dirty="0"/>
+                <a:t>WTN</a:t>
+              </a:r>
+            </a:p>
+          </p:txBody>
+        </p:sp>
+        <p:sp>
+          <p:nvSpPr>
+            <p:cNvPr id="6" name="Textfeld 5">
+              <a:extLst>
+                <a:ext uri="{FF2B5EF4-FFF2-40B4-BE49-F238E27FC236}">
+                  <a16:creationId xmlns:a16="http://schemas.microsoft.com/office/drawing/2014/main" id="{48E18D01-512C-3D79-E309-7ABB3A31E128}"/>
+                </a:ext>
+              </a:extLst>
+            </p:cNvPr>
+            <p:cNvSpPr txBox="1"/>
+            <p:nvPr/>
+          </p:nvSpPr>
+          <p:spPr>
+            <a:xfrm>
+              <a:off x="3354338" y="3929969"/>
+              <a:ext cx="1934291" cy="261610"/>
+            </a:xfrm>
+            <a:prstGeom prst="rect">
+              <a:avLst/>
+            </a:prstGeom>
+            <a:solidFill>
+              <a:schemeClr val="bg1"/>
+            </a:solidFill>
+          </p:spPr>
+          <p:txBody>
+            <a:bodyPr wrap="square" rtlCol="0">
+              <a:spAutoFit/>
+            </a:bodyPr>
+            <a:lstStyle/>
+            <a:p>
+              <a:r>
+                <a:rPr lang="de-DE" sz="1100" dirty="0"/>
+                <a:t>x – Achse parallel Turm </a:t>
+              </a:r>
+              <a:r>
+                <a:rPr lang="de-DE" sz="1100" dirty="0" err="1"/>
+                <a:t>achse</a:t>
+              </a:r>
+              <a:endParaRPr lang="de-DE" sz="1100" dirty="0"/>
+            </a:p>
+          </p:txBody>
+        </p:sp>
+        <p:sp>
+          <p:nvSpPr>
+            <p:cNvPr id="7" name="Textfeld 6">
+              <a:extLst>
+                <a:ext uri="{FF2B5EF4-FFF2-40B4-BE49-F238E27FC236}">
+                  <a16:creationId xmlns:a16="http://schemas.microsoft.com/office/drawing/2014/main" id="{5720BA58-696A-44E2-CA90-5E7B15801C21}"/>
+                </a:ext>
+              </a:extLst>
+            </p:cNvPr>
+            <p:cNvSpPr txBox="1"/>
+            <p:nvPr/>
+          </p:nvSpPr>
+          <p:spPr>
+            <a:xfrm>
+              <a:off x="4589410" y="4585360"/>
+              <a:ext cx="264164" cy="276999"/>
+            </a:xfrm>
+            <a:prstGeom prst="rect">
+              <a:avLst/>
+            </a:prstGeom>
+            <a:solidFill>
+              <a:schemeClr val="bg1"/>
+            </a:solidFill>
+            <a:ln>
+              <a:noFill/>
+            </a:ln>
+          </p:spPr>
+          <p:txBody>
+            <a:bodyPr wrap="square" rtlCol="0">
+              <a:spAutoFit/>
+            </a:bodyPr>
+            <a:lstStyle/>
+            <a:p>
+              <a:r>
+                <a:rPr lang="de-DE" sz="1200" dirty="0">
+                  <a:solidFill>
+                    <a:srgbClr val="FF0000"/>
+                  </a:solidFill>
+                </a:rPr>
+                <a:t>z</a:t>
+              </a:r>
+            </a:p>
+          </p:txBody>
+        </p:sp>
+        <p:sp>
+          <p:nvSpPr>
+            <p:cNvPr id="8" name="Textfeld 7">
+              <a:extLst>
+                <a:ext uri="{FF2B5EF4-FFF2-40B4-BE49-F238E27FC236}">
+                  <a16:creationId xmlns:a16="http://schemas.microsoft.com/office/drawing/2014/main" id="{FB3403A2-7F8A-3916-916E-3E7F8081F5E4}"/>
+                </a:ext>
+              </a:extLst>
+            </p:cNvPr>
+            <p:cNvSpPr txBox="1"/>
+            <p:nvPr/>
+          </p:nvSpPr>
+          <p:spPr>
+            <a:xfrm>
+              <a:off x="3988502" y="4233919"/>
+              <a:ext cx="264164" cy="276999"/>
+            </a:xfrm>
+            <a:prstGeom prst="rect">
+              <a:avLst/>
+            </a:prstGeom>
+            <a:solidFill>
+              <a:schemeClr val="bg1"/>
+            </a:solidFill>
+            <a:ln>
+              <a:noFill/>
+            </a:ln>
+          </p:spPr>
+          <p:txBody>
+            <a:bodyPr wrap="square" rtlCol="0">
+              <a:spAutoFit/>
+            </a:bodyPr>
+            <a:lstStyle/>
+            <a:p>
+              <a:r>
+                <a:rPr lang="de-DE" sz="1200" dirty="0">
+                  <a:solidFill>
+                    <a:srgbClr val="FF0000"/>
+                  </a:solidFill>
+                </a:rPr>
+                <a:t>x</a:t>
+              </a:r>
+            </a:p>
+          </p:txBody>
+        </p:sp>
+        <p:sp>
+          <p:nvSpPr>
+            <p:cNvPr id="9" name="Textfeld 8">
+              <a:extLst>
+                <a:ext uri="{FF2B5EF4-FFF2-40B4-BE49-F238E27FC236}">
+                  <a16:creationId xmlns:a16="http://schemas.microsoft.com/office/drawing/2014/main" id="{643D684C-2B89-BD42-697F-5B61D34ADE4B}"/>
+                </a:ext>
+              </a:extLst>
+            </p:cNvPr>
+            <p:cNvSpPr txBox="1"/>
+            <p:nvPr/>
+          </p:nvSpPr>
+          <p:spPr>
+            <a:xfrm>
+              <a:off x="3770503" y="4499511"/>
+              <a:ext cx="264164" cy="276999"/>
+            </a:xfrm>
+            <a:prstGeom prst="rect">
+              <a:avLst/>
+            </a:prstGeom>
+            <a:solidFill>
+              <a:schemeClr val="bg1"/>
+            </a:solidFill>
+            <a:ln>
+              <a:noFill/>
+            </a:ln>
+          </p:spPr>
+          <p:txBody>
+            <a:bodyPr wrap="square" rtlCol="0">
+              <a:spAutoFit/>
+            </a:bodyPr>
+            <a:lstStyle/>
+            <a:p>
+              <a:r>
+                <a:rPr lang="de-DE" sz="1200" dirty="0">
+                  <a:solidFill>
+                    <a:srgbClr val="FF0000"/>
+                  </a:solidFill>
+                </a:rPr>
+                <a:t>y</a:t>
+              </a:r>
+            </a:p>
+          </p:txBody>
+        </p:sp>
+      </p:grpSp>
+      <p:sp>
+        <p:nvSpPr>
+          <p:cNvPr id="11" name="Textfeld 10">
+            <a:extLst>
+              <a:ext uri="{FF2B5EF4-FFF2-40B4-BE49-F238E27FC236}">
+                <a16:creationId xmlns:a16="http://schemas.microsoft.com/office/drawing/2014/main" id="{58242635-D32B-0A9B-E85E-980EA94C0BCD}"/>
+              </a:ext>
+            </a:extLst>
+          </p:cNvPr>
+          <p:cNvSpPr txBox="1"/>
+          <p:nvPr/>
+        </p:nvSpPr>
+        <p:spPr>
+          <a:xfrm>
+            <a:off x="4420469" y="4169862"/>
+            <a:ext cx="815616" cy="276999"/>
+          </a:xfrm>
+          <a:prstGeom prst="rect">
+            <a:avLst/>
+          </a:prstGeom>
+          <a:solidFill>
+            <a:schemeClr val="bg1"/>
+          </a:solidFill>
+          <a:ln>
+            <a:solidFill>
+              <a:srgbClr val="00B050"/>
+            </a:solidFill>
+          </a:ln>
+        </p:spPr>
+        <p:txBody>
+          <a:bodyPr wrap="square" rtlCol="0">
+            <a:spAutoFit/>
+          </a:bodyPr>
+          <a:lstStyle/>
+          <a:p>
+            <a:r>
+              <a:rPr lang="de-DE" sz="1200" dirty="0" err="1"/>
+              <a:t>Mx</a:t>
+            </a:r>
+            <a:r>
+              <a:rPr lang="de-DE" sz="1200" dirty="0"/>
+              <a:t>, </a:t>
+            </a:r>
+            <a:r>
+              <a:rPr lang="de-DE" sz="1200" dirty="0" err="1"/>
+              <a:t>It</a:t>
+            </a:r>
+            <a:r>
+              <a:rPr lang="de-DE" sz="1200" dirty="0"/>
+              <a:t>, </a:t>
+            </a:r>
+            <a:r>
+              <a:rPr lang="de-DE" sz="1200" dirty="0" err="1"/>
+              <a:t>Fx</a:t>
+            </a:r>
+            <a:endParaRPr lang="de-DE" sz="1200" dirty="0"/>
+          </a:p>
+        </p:txBody>
+      </p:sp>
+      <p:sp>
+        <p:nvSpPr>
+          <p:cNvPr id="12" name="Textfeld 11">
+            <a:extLst>
+              <a:ext uri="{FF2B5EF4-FFF2-40B4-BE49-F238E27FC236}">
+                <a16:creationId xmlns:a16="http://schemas.microsoft.com/office/drawing/2014/main" id="{3347755D-601C-B201-C467-17537C7EFF4C}"/>
+              </a:ext>
+            </a:extLst>
+          </p:cNvPr>
+          <p:cNvSpPr txBox="1"/>
+          <p:nvPr/>
+        </p:nvSpPr>
+        <p:spPr>
+          <a:xfrm>
+            <a:off x="4748087" y="4843982"/>
+            <a:ext cx="815616" cy="276999"/>
+          </a:xfrm>
+          <a:prstGeom prst="rect">
+            <a:avLst/>
+          </a:prstGeom>
+          <a:solidFill>
+            <a:schemeClr val="bg1"/>
+          </a:solidFill>
+          <a:ln>
+            <a:solidFill>
+              <a:srgbClr val="00B050"/>
+            </a:solidFill>
+          </a:ln>
+        </p:spPr>
+        <p:txBody>
+          <a:bodyPr wrap="square" rtlCol="0">
+            <a:spAutoFit/>
+          </a:bodyPr>
+          <a:lstStyle/>
+          <a:p>
+            <a:r>
+              <a:rPr lang="de-DE" sz="1200" dirty="0" err="1"/>
+              <a:t>Mz</a:t>
+            </a:r>
+            <a:r>
+              <a:rPr lang="de-DE" sz="1200" dirty="0"/>
+              <a:t>, </a:t>
+            </a:r>
+            <a:r>
+              <a:rPr lang="de-DE" sz="1200" dirty="0" err="1"/>
+              <a:t>Iz</a:t>
+            </a:r>
+            <a:r>
+              <a:rPr lang="de-DE" sz="1200" dirty="0"/>
+              <a:t>, </a:t>
+            </a:r>
+            <a:r>
+              <a:rPr lang="de-DE" sz="1200" dirty="0" err="1"/>
+              <a:t>Fz</a:t>
+            </a:r>
+            <a:endParaRPr lang="de-DE" sz="1200" dirty="0"/>
+          </a:p>
+        </p:txBody>
+      </p:sp>
+      <p:sp>
+        <p:nvSpPr>
+          <p:cNvPr id="13" name="Textfeld 12">
+            <a:extLst>
+              <a:ext uri="{FF2B5EF4-FFF2-40B4-BE49-F238E27FC236}">
+                <a16:creationId xmlns:a16="http://schemas.microsoft.com/office/drawing/2014/main" id="{C5793FF3-97F0-8D73-D690-4F89261AE58B}"/>
+              </a:ext>
+            </a:extLst>
+          </p:cNvPr>
+          <p:cNvSpPr txBox="1"/>
+          <p:nvPr/>
+        </p:nvSpPr>
+        <p:spPr>
+          <a:xfrm>
+            <a:off x="3109618" y="4850988"/>
+            <a:ext cx="815616" cy="276999"/>
+          </a:xfrm>
+          <a:prstGeom prst="rect">
+            <a:avLst/>
+          </a:prstGeom>
+          <a:solidFill>
+            <a:schemeClr val="bg1"/>
+          </a:solidFill>
+          <a:ln>
+            <a:solidFill>
+              <a:srgbClr val="00B050"/>
+            </a:solidFill>
+          </a:ln>
+        </p:spPr>
+        <p:txBody>
+          <a:bodyPr wrap="square" rtlCol="0">
+            <a:spAutoFit/>
+          </a:bodyPr>
+          <a:lstStyle/>
+          <a:p>
+            <a:r>
+              <a:rPr lang="de-DE" sz="1200" dirty="0" err="1"/>
+              <a:t>My</a:t>
+            </a:r>
+            <a:r>
+              <a:rPr lang="de-DE" sz="1200" dirty="0"/>
+              <a:t>, </a:t>
+            </a:r>
+            <a:r>
+              <a:rPr lang="de-DE" sz="1200" dirty="0" err="1"/>
+              <a:t>Iy</a:t>
+            </a:r>
+            <a:r>
+              <a:rPr lang="de-DE" sz="1200" dirty="0"/>
+              <a:t>, </a:t>
+            </a:r>
+            <a:r>
+              <a:rPr lang="de-DE" sz="1200" dirty="0" err="1"/>
+              <a:t>Fy</a:t>
+            </a:r>
+            <a:endParaRPr lang="de-DE" sz="1200" dirty="0"/>
+          </a:p>
+        </p:txBody>
+      </p:sp>
     </p:spTree>
     <p:extLst>
       <p:ext uri="{BB962C8B-B14F-4D97-AF65-F5344CB8AC3E}">
@@ -8772,6 +9212,1286 @@
     <p:extLst>
       <p:ext uri="{BB962C8B-B14F-4D97-AF65-F5344CB8AC3E}">
         <p14:creationId xmlns:p14="http://schemas.microsoft.com/office/powerpoint/2010/main" val="1564355837"/>
+      </p:ext>
+    </p:extLst>
+  </p:cSld>
+  <p:clrMapOvr>
+    <a:masterClrMapping/>
+  </p:clrMapOvr>
+</p:sld>
+</file>
+
+<file path=ppt/slides/slide4.xml><?xml version="1.0" encoding="utf-8"?>
+<p:sld xmlns:a="http://schemas.openxmlformats.org/drawingml/2006/main" xmlns:r="http://schemas.openxmlformats.org/officeDocument/2006/relationships" xmlns:p="http://schemas.openxmlformats.org/presentationml/2006/main">
+  <p:cSld>
+    <p:spTree>
+      <p:nvGrpSpPr>
+        <p:cNvPr id="1" name=""/>
+        <p:cNvGrpSpPr/>
+        <p:nvPr/>
+      </p:nvGrpSpPr>
+      <p:grpSpPr>
+        <a:xfrm>
+          <a:off x="0" y="0"/>
+          <a:ext cx="0" cy="0"/>
+          <a:chOff x="0" y="0"/>
+          <a:chExt cx="0" cy="0"/>
+        </a:xfrm>
+      </p:grpSpPr>
+      <p:sp>
+        <p:nvSpPr>
+          <p:cNvPr id="68" name="Textfeld 67">
+            <a:extLst>
+              <a:ext uri="{FF2B5EF4-FFF2-40B4-BE49-F238E27FC236}">
+                <a16:creationId xmlns:a16="http://schemas.microsoft.com/office/drawing/2014/main" id="{C2577F17-0527-4C68-A239-4588BE18F434}"/>
+              </a:ext>
+            </a:extLst>
+          </p:cNvPr>
+          <p:cNvSpPr txBox="1"/>
+          <p:nvPr/>
+        </p:nvSpPr>
+        <p:spPr>
+          <a:xfrm>
+            <a:off x="3854827" y="3188399"/>
+            <a:ext cx="1550916" cy="276999"/>
+          </a:xfrm>
+          <a:prstGeom prst="rect">
+            <a:avLst/>
+          </a:prstGeom>
+          <a:solidFill>
+            <a:schemeClr val="bg1"/>
+          </a:solidFill>
+          <a:ln>
+            <a:solidFill>
+              <a:srgbClr val="00B050"/>
+            </a:solidFill>
+          </a:ln>
+        </p:spPr>
+        <p:txBody>
+          <a:bodyPr wrap="square" rtlCol="0">
+            <a:spAutoFit/>
+          </a:bodyPr>
+          <a:lstStyle/>
+          <a:p>
+            <a:r>
+              <a:rPr lang="de-DE" sz="1200" dirty="0"/>
+              <a:t>My, </a:t>
+            </a:r>
+            <a:r>
+              <a:rPr lang="de-DE" sz="1200" dirty="0" err="1"/>
+              <a:t>Fy</a:t>
+            </a:r>
+            <a:endParaRPr lang="de-DE" sz="1200" dirty="0"/>
+          </a:p>
+        </p:txBody>
+      </p:sp>
+      <p:sp>
+        <p:nvSpPr>
+          <p:cNvPr id="69" name="Textfeld 68">
+            <a:extLst>
+              <a:ext uri="{FF2B5EF4-FFF2-40B4-BE49-F238E27FC236}">
+                <a16:creationId xmlns:a16="http://schemas.microsoft.com/office/drawing/2014/main" id="{E247FE66-6FFB-4CB2-8C62-4958F52DAB3B}"/>
+              </a:ext>
+            </a:extLst>
+          </p:cNvPr>
+          <p:cNvSpPr txBox="1"/>
+          <p:nvPr/>
+        </p:nvSpPr>
+        <p:spPr>
+          <a:xfrm>
+            <a:off x="3866857" y="3745458"/>
+            <a:ext cx="1538886" cy="276999"/>
+          </a:xfrm>
+          <a:prstGeom prst="rect">
+            <a:avLst/>
+          </a:prstGeom>
+          <a:solidFill>
+            <a:schemeClr val="bg1"/>
+          </a:solidFill>
+          <a:ln>
+            <a:solidFill>
+              <a:srgbClr val="00B050"/>
+            </a:solidFill>
+          </a:ln>
+        </p:spPr>
+        <p:txBody>
+          <a:bodyPr wrap="square" rtlCol="0">
+            <a:spAutoFit/>
+          </a:bodyPr>
+          <a:lstStyle/>
+          <a:p>
+            <a:r>
+              <a:rPr lang="de-DE" sz="1200" dirty="0" err="1"/>
+              <a:t>Mz</a:t>
+            </a:r>
+            <a:r>
+              <a:rPr lang="de-DE" sz="1200" dirty="0"/>
+              <a:t>, </a:t>
+            </a:r>
+            <a:r>
+              <a:rPr lang="de-DE" sz="1200" dirty="0" err="1"/>
+              <a:t>Fz</a:t>
+            </a:r>
+            <a:endParaRPr lang="de-DE" sz="1200" dirty="0"/>
+          </a:p>
+        </p:txBody>
+      </p:sp>
+      <p:sp>
+        <p:nvSpPr>
+          <p:cNvPr id="70" name="Textfeld 69">
+            <a:extLst>
+              <a:ext uri="{FF2B5EF4-FFF2-40B4-BE49-F238E27FC236}">
+                <a16:creationId xmlns:a16="http://schemas.microsoft.com/office/drawing/2014/main" id="{CD40EBEB-F568-4985-9EB1-9679661583F7}"/>
+              </a:ext>
+            </a:extLst>
+          </p:cNvPr>
+          <p:cNvSpPr txBox="1"/>
+          <p:nvPr/>
+        </p:nvSpPr>
+        <p:spPr>
+          <a:xfrm>
+            <a:off x="3854828" y="2675710"/>
+            <a:ext cx="1550916" cy="276999"/>
+          </a:xfrm>
+          <a:prstGeom prst="rect">
+            <a:avLst/>
+          </a:prstGeom>
+          <a:solidFill>
+            <a:schemeClr val="bg1"/>
+          </a:solidFill>
+          <a:ln>
+            <a:solidFill>
+              <a:srgbClr val="00B050"/>
+            </a:solidFill>
+          </a:ln>
+        </p:spPr>
+        <p:txBody>
+          <a:bodyPr wrap="square" rtlCol="0">
+            <a:spAutoFit/>
+          </a:bodyPr>
+          <a:lstStyle/>
+          <a:p>
+            <a:r>
+              <a:rPr lang="de-DE" sz="1200" dirty="0" err="1"/>
+              <a:t>Mx</a:t>
+            </a:r>
+            <a:r>
+              <a:rPr lang="de-DE" sz="1200" dirty="0"/>
+              <a:t>, </a:t>
+            </a:r>
+            <a:r>
+              <a:rPr lang="de-DE" sz="1200" dirty="0" err="1"/>
+              <a:t>Fx</a:t>
+            </a:r>
+            <a:r>
+              <a:rPr lang="de-DE" sz="1200" dirty="0"/>
+              <a:t>,</a:t>
+            </a:r>
+          </a:p>
+        </p:txBody>
+      </p:sp>
+      <p:sp>
+        <p:nvSpPr>
+          <p:cNvPr id="71" name="Textfeld 70">
+            <a:extLst>
+              <a:ext uri="{FF2B5EF4-FFF2-40B4-BE49-F238E27FC236}">
+                <a16:creationId xmlns:a16="http://schemas.microsoft.com/office/drawing/2014/main" id="{6FF2602C-F95C-4108-925B-34E3067C0494}"/>
+              </a:ext>
+            </a:extLst>
+          </p:cNvPr>
+          <p:cNvSpPr txBox="1"/>
+          <p:nvPr/>
+        </p:nvSpPr>
+        <p:spPr>
+          <a:xfrm>
+            <a:off x="7110117" y="3204548"/>
+            <a:ext cx="1388948" cy="276999"/>
+          </a:xfrm>
+          <a:prstGeom prst="rect">
+            <a:avLst/>
+          </a:prstGeom>
+          <a:solidFill>
+            <a:schemeClr val="bg1"/>
+          </a:solidFill>
+          <a:ln>
+            <a:solidFill>
+              <a:srgbClr val="00B050"/>
+            </a:solidFill>
+          </a:ln>
+        </p:spPr>
+        <p:txBody>
+          <a:bodyPr wrap="square" rtlCol="0">
+            <a:spAutoFit/>
+          </a:bodyPr>
+          <a:lstStyle/>
+          <a:p>
+            <a:r>
+              <a:rPr lang="de-DE" sz="1200" dirty="0"/>
+              <a:t>My, </a:t>
+            </a:r>
+            <a:r>
+              <a:rPr lang="de-DE" sz="1200" dirty="0" err="1"/>
+              <a:t>Fy</a:t>
+            </a:r>
+            <a:endParaRPr lang="de-DE" sz="1200" dirty="0"/>
+          </a:p>
+        </p:txBody>
+      </p:sp>
+      <p:sp>
+        <p:nvSpPr>
+          <p:cNvPr id="72" name="Pfeil: nach rechts 71">
+            <a:extLst>
+              <a:ext uri="{FF2B5EF4-FFF2-40B4-BE49-F238E27FC236}">
+                <a16:creationId xmlns:a16="http://schemas.microsoft.com/office/drawing/2014/main" id="{DC9709CE-6B65-4CB0-8043-97268559C741}"/>
+              </a:ext>
+            </a:extLst>
+          </p:cNvPr>
+          <p:cNvSpPr/>
+          <p:nvPr/>
+        </p:nvSpPr>
+        <p:spPr>
+          <a:xfrm rot="18856213">
+            <a:off x="653566" y="4164317"/>
+            <a:ext cx="697185" cy="464505"/>
+          </a:xfrm>
+          <a:prstGeom prst="rightArrow">
+            <a:avLst/>
+          </a:prstGeom>
+        </p:spPr>
+        <p:style>
+          <a:lnRef idx="2">
+            <a:schemeClr val="accent1">
+              <a:shade val="50000"/>
+            </a:schemeClr>
+          </a:lnRef>
+          <a:fillRef idx="1">
+            <a:schemeClr val="accent1"/>
+          </a:fillRef>
+          <a:effectRef idx="0">
+            <a:schemeClr val="accent1"/>
+          </a:effectRef>
+          <a:fontRef idx="minor">
+            <a:schemeClr val="lt1"/>
+          </a:fontRef>
+        </p:style>
+        <p:txBody>
+          <a:bodyPr rtlCol="0" anchor="ctr"/>
+          <a:lstStyle/>
+          <a:p>
+            <a:pPr algn="ctr"/>
+            <a:r>
+              <a:rPr lang="de-DE" sz="1400" dirty="0"/>
+              <a:t>Wind</a:t>
+            </a:r>
+          </a:p>
+        </p:txBody>
+      </p:sp>
+      <p:sp>
+        <p:nvSpPr>
+          <p:cNvPr id="73" name="Textfeld 72">
+            <a:extLst>
+              <a:ext uri="{FF2B5EF4-FFF2-40B4-BE49-F238E27FC236}">
+                <a16:creationId xmlns:a16="http://schemas.microsoft.com/office/drawing/2014/main" id="{0C5324B6-436D-4AD7-9AA2-F49E1C1DFF33}"/>
+              </a:ext>
+            </a:extLst>
+          </p:cNvPr>
+          <p:cNvSpPr txBox="1"/>
+          <p:nvPr/>
+        </p:nvSpPr>
+        <p:spPr>
+          <a:xfrm>
+            <a:off x="7005659" y="3745458"/>
+            <a:ext cx="1550916" cy="276999"/>
+          </a:xfrm>
+          <a:prstGeom prst="rect">
+            <a:avLst/>
+          </a:prstGeom>
+          <a:solidFill>
+            <a:schemeClr val="bg1"/>
+          </a:solidFill>
+          <a:ln>
+            <a:solidFill>
+              <a:srgbClr val="00B050"/>
+            </a:solidFill>
+          </a:ln>
+        </p:spPr>
+        <p:txBody>
+          <a:bodyPr wrap="square" rtlCol="0">
+            <a:spAutoFit/>
+          </a:bodyPr>
+          <a:lstStyle/>
+          <a:p>
+            <a:r>
+              <a:rPr lang="de-DE" sz="1200" dirty="0" err="1"/>
+              <a:t>Mx</a:t>
+            </a:r>
+            <a:r>
+              <a:rPr lang="de-DE" sz="1200" dirty="0"/>
+              <a:t>, </a:t>
+            </a:r>
+            <a:r>
+              <a:rPr lang="de-DE" sz="1200" dirty="0" err="1"/>
+              <a:t>Fx</a:t>
+            </a:r>
+            <a:endParaRPr lang="de-DE" sz="1200" dirty="0"/>
+          </a:p>
+        </p:txBody>
+      </p:sp>
+      <p:sp>
+        <p:nvSpPr>
+          <p:cNvPr id="74" name="Textfeld 73">
+            <a:extLst>
+              <a:ext uri="{FF2B5EF4-FFF2-40B4-BE49-F238E27FC236}">
+                <a16:creationId xmlns:a16="http://schemas.microsoft.com/office/drawing/2014/main" id="{448CAE64-761E-4954-B56C-08A42449E08D}"/>
+              </a:ext>
+            </a:extLst>
+          </p:cNvPr>
+          <p:cNvSpPr txBox="1"/>
+          <p:nvPr/>
+        </p:nvSpPr>
+        <p:spPr>
+          <a:xfrm>
+            <a:off x="7126898" y="2650956"/>
+            <a:ext cx="1372167" cy="276999"/>
+          </a:xfrm>
+          <a:prstGeom prst="rect">
+            <a:avLst/>
+          </a:prstGeom>
+          <a:solidFill>
+            <a:schemeClr val="bg1"/>
+          </a:solidFill>
+          <a:ln>
+            <a:solidFill>
+              <a:srgbClr val="00B050"/>
+            </a:solidFill>
+          </a:ln>
+        </p:spPr>
+        <p:txBody>
+          <a:bodyPr wrap="square" rtlCol="0">
+            <a:spAutoFit/>
+          </a:bodyPr>
+          <a:lstStyle/>
+          <a:p>
+            <a:r>
+              <a:rPr lang="de-DE" sz="1200" dirty="0" err="1"/>
+              <a:t>Mz</a:t>
+            </a:r>
+            <a:r>
+              <a:rPr lang="de-DE" sz="1200" dirty="0"/>
+              <a:t>, </a:t>
+            </a:r>
+            <a:r>
+              <a:rPr lang="de-DE" sz="1200" dirty="0" err="1"/>
+              <a:t>Fz</a:t>
+            </a:r>
+            <a:endParaRPr lang="de-DE" sz="1200" dirty="0"/>
+          </a:p>
+        </p:txBody>
+      </p:sp>
+      <p:cxnSp>
+        <p:nvCxnSpPr>
+          <p:cNvPr id="83" name="Gerade Verbindung mit Pfeil 82">
+            <a:extLst>
+              <a:ext uri="{FF2B5EF4-FFF2-40B4-BE49-F238E27FC236}">
+                <a16:creationId xmlns:a16="http://schemas.microsoft.com/office/drawing/2014/main" id="{D9B82109-E0BB-4B0B-AB1A-2E2814EAD8D2}"/>
+              </a:ext>
+            </a:extLst>
+          </p:cNvPr>
+          <p:cNvCxnSpPr>
+            <a:cxnSpLocks/>
+            <a:stCxn id="69" idx="3"/>
+            <a:endCxn id="73" idx="1"/>
+          </p:cNvCxnSpPr>
+          <p:nvPr/>
+        </p:nvCxnSpPr>
+        <p:spPr>
+          <a:xfrm>
+            <a:off x="5405743" y="3883958"/>
+            <a:ext cx="1599916" cy="0"/>
+          </a:xfrm>
+          <a:prstGeom prst="straightConnector1">
+            <a:avLst/>
+          </a:prstGeom>
+          <a:ln>
+            <a:tailEnd type="triangle"/>
+          </a:ln>
+        </p:spPr>
+        <p:style>
+          <a:lnRef idx="1">
+            <a:schemeClr val="accent1"/>
+          </a:lnRef>
+          <a:fillRef idx="0">
+            <a:schemeClr val="accent1"/>
+          </a:fillRef>
+          <a:effectRef idx="0">
+            <a:schemeClr val="accent1"/>
+          </a:effectRef>
+          <a:fontRef idx="minor">
+            <a:schemeClr val="tx1"/>
+          </a:fontRef>
+        </p:style>
+      </p:cxnSp>
+      <p:cxnSp>
+        <p:nvCxnSpPr>
+          <p:cNvPr id="85" name="Gerade Verbindung mit Pfeil 84">
+            <a:extLst>
+              <a:ext uri="{FF2B5EF4-FFF2-40B4-BE49-F238E27FC236}">
+                <a16:creationId xmlns:a16="http://schemas.microsoft.com/office/drawing/2014/main" id="{558BA919-3DFE-426C-BCE4-145503402C6B}"/>
+              </a:ext>
+            </a:extLst>
+          </p:cNvPr>
+          <p:cNvCxnSpPr>
+            <a:cxnSpLocks/>
+            <a:stCxn id="68" idx="3"/>
+            <a:endCxn id="71" idx="1"/>
+          </p:cNvCxnSpPr>
+          <p:nvPr/>
+        </p:nvCxnSpPr>
+        <p:spPr>
+          <a:xfrm>
+            <a:off x="5405743" y="3326899"/>
+            <a:ext cx="1704374" cy="16149"/>
+          </a:xfrm>
+          <a:prstGeom prst="straightConnector1">
+            <a:avLst/>
+          </a:prstGeom>
+          <a:ln>
+            <a:tailEnd type="triangle"/>
+          </a:ln>
+        </p:spPr>
+        <p:style>
+          <a:lnRef idx="1">
+            <a:schemeClr val="accent1"/>
+          </a:lnRef>
+          <a:fillRef idx="0">
+            <a:schemeClr val="accent1"/>
+          </a:fillRef>
+          <a:effectRef idx="0">
+            <a:schemeClr val="accent1"/>
+          </a:effectRef>
+          <a:fontRef idx="minor">
+            <a:schemeClr val="tx1"/>
+          </a:fontRef>
+        </p:style>
+      </p:cxnSp>
+      <p:cxnSp>
+        <p:nvCxnSpPr>
+          <p:cNvPr id="87" name="Gerade Verbindung mit Pfeil 86">
+            <a:extLst>
+              <a:ext uri="{FF2B5EF4-FFF2-40B4-BE49-F238E27FC236}">
+                <a16:creationId xmlns:a16="http://schemas.microsoft.com/office/drawing/2014/main" id="{8E71A821-BA08-4EA4-A373-E1E8771C8BD1}"/>
+              </a:ext>
+            </a:extLst>
+          </p:cNvPr>
+          <p:cNvCxnSpPr>
+            <a:cxnSpLocks/>
+            <a:stCxn id="70" idx="3"/>
+            <a:endCxn id="74" idx="1"/>
+          </p:cNvCxnSpPr>
+          <p:nvPr/>
+        </p:nvCxnSpPr>
+        <p:spPr>
+          <a:xfrm flipV="1">
+            <a:off x="5405744" y="2789456"/>
+            <a:ext cx="1721154" cy="24754"/>
+          </a:xfrm>
+          <a:prstGeom prst="straightConnector1">
+            <a:avLst/>
+          </a:prstGeom>
+          <a:ln>
+            <a:tailEnd type="triangle"/>
+          </a:ln>
+        </p:spPr>
+        <p:style>
+          <a:lnRef idx="1">
+            <a:schemeClr val="accent1"/>
+          </a:lnRef>
+          <a:fillRef idx="0">
+            <a:schemeClr val="accent1"/>
+          </a:fillRef>
+          <a:effectRef idx="0">
+            <a:schemeClr val="accent1"/>
+          </a:effectRef>
+          <a:fontRef idx="minor">
+            <a:schemeClr val="tx1"/>
+          </a:fontRef>
+        </p:style>
+      </p:cxnSp>
+      <p:sp>
+        <p:nvSpPr>
+          <p:cNvPr id="81" name="Textfeld 80">
+            <a:extLst>
+              <a:ext uri="{FF2B5EF4-FFF2-40B4-BE49-F238E27FC236}">
+                <a16:creationId xmlns:a16="http://schemas.microsoft.com/office/drawing/2014/main" id="{9D7165E1-1DE4-468A-AB5E-6738A7C55933}"/>
+              </a:ext>
+            </a:extLst>
+          </p:cNvPr>
+          <p:cNvSpPr txBox="1"/>
+          <p:nvPr/>
+        </p:nvSpPr>
+        <p:spPr>
+          <a:xfrm>
+            <a:off x="5738515" y="3226263"/>
+            <a:ext cx="1170723" cy="276999"/>
+          </a:xfrm>
+          <a:prstGeom prst="rect">
+            <a:avLst/>
+          </a:prstGeom>
+          <a:solidFill>
+            <a:schemeClr val="bg1"/>
+          </a:solidFill>
+          <a:ln>
+            <a:solidFill>
+              <a:schemeClr val="accent1"/>
+            </a:solidFill>
+          </a:ln>
+        </p:spPr>
+        <p:txBody>
+          <a:bodyPr wrap="square" rtlCol="0">
+            <a:spAutoFit/>
+          </a:bodyPr>
+          <a:lstStyle/>
+          <a:p>
+            <a:r>
+              <a:rPr lang="de-DE" sz="1200" dirty="0"/>
+              <a:t>WTN </a:t>
+            </a:r>
+            <a:r>
+              <a:rPr lang="de-DE" sz="1200" dirty="0">
+                <a:sym typeface="Wingdings" panose="05000000000000000000" pitchFamily="2" charset="2"/>
+              </a:rPr>
+              <a:t> IEA</a:t>
+            </a:r>
+            <a:endParaRPr lang="de-DE" sz="1200" dirty="0"/>
+          </a:p>
+        </p:txBody>
+      </p:sp>
+      <p:sp>
+        <p:nvSpPr>
+          <p:cNvPr id="130" name="Textfeld 129">
+            <a:extLst>
+              <a:ext uri="{FF2B5EF4-FFF2-40B4-BE49-F238E27FC236}">
+                <a16:creationId xmlns:a16="http://schemas.microsoft.com/office/drawing/2014/main" id="{4E73326E-44AE-4423-85B5-F9E66925466B}"/>
+              </a:ext>
+            </a:extLst>
+          </p:cNvPr>
+          <p:cNvSpPr txBox="1"/>
+          <p:nvPr/>
+        </p:nvSpPr>
+        <p:spPr>
+          <a:xfrm>
+            <a:off x="3854827" y="2122877"/>
+            <a:ext cx="4642165" cy="307777"/>
+          </a:xfrm>
+          <a:prstGeom prst="rect">
+            <a:avLst/>
+          </a:prstGeom>
+          <a:noFill/>
+          <a:ln w="28575">
+            <a:solidFill>
+              <a:srgbClr val="00B050"/>
+            </a:solidFill>
+          </a:ln>
+        </p:spPr>
+        <p:txBody>
+          <a:bodyPr wrap="square" rtlCol="0">
+            <a:spAutoFit/>
+          </a:bodyPr>
+          <a:lstStyle/>
+          <a:p>
+            <a:r>
+              <a:rPr lang="de-DE" sz="1400" dirty="0"/>
+              <a:t>Übersetzung zur Eingabe der Lasten</a:t>
+            </a:r>
+          </a:p>
+        </p:txBody>
+      </p:sp>
+      <p:grpSp>
+        <p:nvGrpSpPr>
+          <p:cNvPr id="21" name="Gruppieren 20">
+            <a:extLst>
+              <a:ext uri="{FF2B5EF4-FFF2-40B4-BE49-F238E27FC236}">
+                <a16:creationId xmlns:a16="http://schemas.microsoft.com/office/drawing/2014/main" id="{715831DC-E694-AC8E-063D-2D50F89CEB8E}"/>
+              </a:ext>
+            </a:extLst>
+          </p:cNvPr>
+          <p:cNvGrpSpPr/>
+          <p:nvPr/>
+        </p:nvGrpSpPr>
+        <p:grpSpPr>
+          <a:xfrm>
+            <a:off x="1088898" y="1376327"/>
+            <a:ext cx="2454085" cy="2993676"/>
+            <a:chOff x="9469513" y="1621168"/>
+            <a:chExt cx="2454085" cy="2993676"/>
+          </a:xfrm>
+        </p:grpSpPr>
+        <p:grpSp>
+          <p:nvGrpSpPr>
+            <p:cNvPr id="6" name="Gruppieren 5">
+              <a:extLst>
+                <a:ext uri="{FF2B5EF4-FFF2-40B4-BE49-F238E27FC236}">
+                  <a16:creationId xmlns:a16="http://schemas.microsoft.com/office/drawing/2014/main" id="{F896D738-E7B5-59D1-D41F-0EF75ABAA4AE}"/>
+                </a:ext>
+              </a:extLst>
+            </p:cNvPr>
+            <p:cNvGrpSpPr/>
+            <p:nvPr/>
+          </p:nvGrpSpPr>
+          <p:grpSpPr>
+            <a:xfrm>
+              <a:off x="9692162" y="1621168"/>
+              <a:ext cx="1956362" cy="2993676"/>
+              <a:chOff x="3332267" y="3588988"/>
+              <a:chExt cx="1956362" cy="2993676"/>
+            </a:xfrm>
+          </p:grpSpPr>
+          <p:pic>
+            <p:nvPicPr>
+              <p:cNvPr id="7" name="Grafik 6">
+                <a:extLst>
+                  <a:ext uri="{FF2B5EF4-FFF2-40B4-BE49-F238E27FC236}">
+                    <a16:creationId xmlns:a16="http://schemas.microsoft.com/office/drawing/2014/main" id="{AE2536C3-2A03-C4B3-2FB9-FE30F449CCDD}"/>
+                  </a:ext>
+                </a:extLst>
+              </p:cNvPr>
+              <p:cNvPicPr>
+                <a:picLocks noChangeAspect="1"/>
+              </p:cNvPicPr>
+              <p:nvPr/>
+            </p:nvPicPr>
+            <p:blipFill>
+              <a:blip r:embed="rId2"/>
+              <a:stretch>
+                <a:fillRect/>
+              </a:stretch>
+            </p:blipFill>
+            <p:spPr>
+              <a:xfrm>
+                <a:off x="3332267" y="3588988"/>
+                <a:ext cx="1912311" cy="2993676"/>
+              </a:xfrm>
+              <a:prstGeom prst="rect">
+                <a:avLst/>
+              </a:prstGeom>
+            </p:spPr>
+          </p:pic>
+          <p:sp>
+            <p:nvSpPr>
+              <p:cNvPr id="8" name="Textfeld 7">
+                <a:extLst>
+                  <a:ext uri="{FF2B5EF4-FFF2-40B4-BE49-F238E27FC236}">
+                    <a16:creationId xmlns:a16="http://schemas.microsoft.com/office/drawing/2014/main" id="{640D0433-8589-7C8D-8056-A422C2FC2A39}"/>
+                  </a:ext>
+                </a:extLst>
+              </p:cNvPr>
+              <p:cNvSpPr txBox="1"/>
+              <p:nvPr/>
+            </p:nvSpPr>
+            <p:spPr>
+              <a:xfrm>
+                <a:off x="3973886" y="3597394"/>
+                <a:ext cx="571272" cy="261610"/>
+              </a:xfrm>
+              <a:prstGeom prst="rect">
+                <a:avLst/>
+              </a:prstGeom>
+              <a:solidFill>
+                <a:schemeClr val="bg1"/>
+              </a:solidFill>
+            </p:spPr>
+            <p:txBody>
+              <a:bodyPr wrap="square" rtlCol="0">
+                <a:spAutoFit/>
+              </a:bodyPr>
+              <a:lstStyle/>
+              <a:p>
+                <a:r>
+                  <a:rPr lang="de-DE" sz="1100" dirty="0"/>
+                  <a:t>WTN</a:t>
+                </a:r>
+              </a:p>
+            </p:txBody>
+          </p:sp>
+          <p:sp>
+            <p:nvSpPr>
+              <p:cNvPr id="9" name="Textfeld 8">
+                <a:extLst>
+                  <a:ext uri="{FF2B5EF4-FFF2-40B4-BE49-F238E27FC236}">
+                    <a16:creationId xmlns:a16="http://schemas.microsoft.com/office/drawing/2014/main" id="{55FB1843-8B37-36BE-577D-CFA94A862B18}"/>
+                  </a:ext>
+                </a:extLst>
+              </p:cNvPr>
+              <p:cNvSpPr txBox="1"/>
+              <p:nvPr/>
+            </p:nvSpPr>
+            <p:spPr>
+              <a:xfrm>
+                <a:off x="3354338" y="3929969"/>
+                <a:ext cx="1934291" cy="261610"/>
+              </a:xfrm>
+              <a:prstGeom prst="rect">
+                <a:avLst/>
+              </a:prstGeom>
+              <a:solidFill>
+                <a:schemeClr val="bg1"/>
+              </a:solidFill>
+            </p:spPr>
+            <p:txBody>
+              <a:bodyPr wrap="square" rtlCol="0">
+                <a:spAutoFit/>
+              </a:bodyPr>
+              <a:lstStyle/>
+              <a:p>
+                <a:r>
+                  <a:rPr lang="de-DE" sz="1100" dirty="0"/>
+                  <a:t>x – Achse parallel Turm </a:t>
+                </a:r>
+                <a:r>
+                  <a:rPr lang="de-DE" sz="1100" dirty="0" err="1"/>
+                  <a:t>achse</a:t>
+                </a:r>
+                <a:endParaRPr lang="de-DE" sz="1100" dirty="0"/>
+              </a:p>
+            </p:txBody>
+          </p:sp>
+          <p:sp>
+            <p:nvSpPr>
+              <p:cNvPr id="10" name="Textfeld 9">
+                <a:extLst>
+                  <a:ext uri="{FF2B5EF4-FFF2-40B4-BE49-F238E27FC236}">
+                    <a16:creationId xmlns:a16="http://schemas.microsoft.com/office/drawing/2014/main" id="{F2624E70-FF75-133D-87D4-644C76E681DA}"/>
+                  </a:ext>
+                </a:extLst>
+              </p:cNvPr>
+              <p:cNvSpPr txBox="1"/>
+              <p:nvPr/>
+            </p:nvSpPr>
+            <p:spPr>
+              <a:xfrm>
+                <a:off x="4589410" y="4585360"/>
+                <a:ext cx="264164" cy="276999"/>
+              </a:xfrm>
+              <a:prstGeom prst="rect">
+                <a:avLst/>
+              </a:prstGeom>
+              <a:solidFill>
+                <a:schemeClr val="bg1"/>
+              </a:solidFill>
+              <a:ln>
+                <a:noFill/>
+              </a:ln>
+            </p:spPr>
+            <p:txBody>
+              <a:bodyPr wrap="square" rtlCol="0">
+                <a:spAutoFit/>
+              </a:bodyPr>
+              <a:lstStyle/>
+              <a:p>
+                <a:r>
+                  <a:rPr lang="de-DE" sz="1200" dirty="0">
+                    <a:solidFill>
+                      <a:srgbClr val="FF0000"/>
+                    </a:solidFill>
+                  </a:rPr>
+                  <a:t>z</a:t>
+                </a:r>
+              </a:p>
+            </p:txBody>
+          </p:sp>
+          <p:sp>
+            <p:nvSpPr>
+              <p:cNvPr id="11" name="Textfeld 10">
+                <a:extLst>
+                  <a:ext uri="{FF2B5EF4-FFF2-40B4-BE49-F238E27FC236}">
+                    <a16:creationId xmlns:a16="http://schemas.microsoft.com/office/drawing/2014/main" id="{22878BC7-A4D6-FBD8-3A11-62AF17BDE1BF}"/>
+                  </a:ext>
+                </a:extLst>
+              </p:cNvPr>
+              <p:cNvSpPr txBox="1"/>
+              <p:nvPr/>
+            </p:nvSpPr>
+            <p:spPr>
+              <a:xfrm>
+                <a:off x="3988502" y="4233919"/>
+                <a:ext cx="264164" cy="276999"/>
+              </a:xfrm>
+              <a:prstGeom prst="rect">
+                <a:avLst/>
+              </a:prstGeom>
+              <a:solidFill>
+                <a:schemeClr val="bg1"/>
+              </a:solidFill>
+              <a:ln>
+                <a:noFill/>
+              </a:ln>
+            </p:spPr>
+            <p:txBody>
+              <a:bodyPr wrap="square" rtlCol="0">
+                <a:spAutoFit/>
+              </a:bodyPr>
+              <a:lstStyle/>
+              <a:p>
+                <a:r>
+                  <a:rPr lang="de-DE" sz="1200" dirty="0">
+                    <a:solidFill>
+                      <a:srgbClr val="FF0000"/>
+                    </a:solidFill>
+                  </a:rPr>
+                  <a:t>x</a:t>
+                </a:r>
+              </a:p>
+            </p:txBody>
+          </p:sp>
+          <p:sp>
+            <p:nvSpPr>
+              <p:cNvPr id="12" name="Textfeld 11">
+                <a:extLst>
+                  <a:ext uri="{FF2B5EF4-FFF2-40B4-BE49-F238E27FC236}">
+                    <a16:creationId xmlns:a16="http://schemas.microsoft.com/office/drawing/2014/main" id="{86A666FC-705A-8588-5DF1-BF3F876FD011}"/>
+                  </a:ext>
+                </a:extLst>
+              </p:cNvPr>
+              <p:cNvSpPr txBox="1"/>
+              <p:nvPr/>
+            </p:nvSpPr>
+            <p:spPr>
+              <a:xfrm>
+                <a:off x="3770503" y="4499511"/>
+                <a:ext cx="264164" cy="276999"/>
+              </a:xfrm>
+              <a:prstGeom prst="rect">
+                <a:avLst/>
+              </a:prstGeom>
+              <a:solidFill>
+                <a:schemeClr val="bg1"/>
+              </a:solidFill>
+              <a:ln>
+                <a:noFill/>
+              </a:ln>
+            </p:spPr>
+            <p:txBody>
+              <a:bodyPr wrap="square" rtlCol="0">
+                <a:spAutoFit/>
+              </a:bodyPr>
+              <a:lstStyle/>
+              <a:p>
+                <a:r>
+                  <a:rPr lang="de-DE" sz="1200" dirty="0">
+                    <a:solidFill>
+                      <a:srgbClr val="FF0000"/>
+                    </a:solidFill>
+                  </a:rPr>
+                  <a:t>y</a:t>
+                </a:r>
+              </a:p>
+            </p:txBody>
+          </p:sp>
+        </p:grpSp>
+        <p:sp>
+          <p:nvSpPr>
+            <p:cNvPr id="13" name="Textfeld 12">
+              <a:extLst>
+                <a:ext uri="{FF2B5EF4-FFF2-40B4-BE49-F238E27FC236}">
+                  <a16:creationId xmlns:a16="http://schemas.microsoft.com/office/drawing/2014/main" id="{A7E0A315-C6F3-F03B-E9E8-FA0288287B57}"/>
+                </a:ext>
+              </a:extLst>
+            </p:cNvPr>
+            <p:cNvSpPr txBox="1"/>
+            <p:nvPr/>
+          </p:nvSpPr>
+          <p:spPr>
+            <a:xfrm>
+              <a:off x="10780364" y="2202042"/>
+              <a:ext cx="815616" cy="276999"/>
+            </a:xfrm>
+            <a:prstGeom prst="rect">
+              <a:avLst/>
+            </a:prstGeom>
+            <a:solidFill>
+              <a:schemeClr val="bg1"/>
+            </a:solidFill>
+            <a:ln>
+              <a:solidFill>
+                <a:srgbClr val="00B050"/>
+              </a:solidFill>
+            </a:ln>
+          </p:spPr>
+          <p:txBody>
+            <a:bodyPr wrap="square" rtlCol="0">
+              <a:spAutoFit/>
+            </a:bodyPr>
+            <a:lstStyle/>
+            <a:p>
+              <a:r>
+                <a:rPr lang="de-DE" sz="1200" dirty="0" err="1"/>
+                <a:t>Mx</a:t>
+              </a:r>
+              <a:r>
+                <a:rPr lang="de-DE" sz="1200" dirty="0"/>
+                <a:t>, </a:t>
+              </a:r>
+              <a:r>
+                <a:rPr lang="de-DE" sz="1200" dirty="0" err="1"/>
+                <a:t>Fx</a:t>
+              </a:r>
+              <a:endParaRPr lang="de-DE" sz="1200" dirty="0"/>
+            </a:p>
+          </p:txBody>
+        </p:sp>
+        <p:sp>
+          <p:nvSpPr>
+            <p:cNvPr id="14" name="Textfeld 13">
+              <a:extLst>
+                <a:ext uri="{FF2B5EF4-FFF2-40B4-BE49-F238E27FC236}">
+                  <a16:creationId xmlns:a16="http://schemas.microsoft.com/office/drawing/2014/main" id="{232B1C42-947B-4A20-9D97-D732F7618E78}"/>
+                </a:ext>
+              </a:extLst>
+            </p:cNvPr>
+            <p:cNvSpPr txBox="1"/>
+            <p:nvPr/>
+          </p:nvSpPr>
+          <p:spPr>
+            <a:xfrm>
+              <a:off x="11107982" y="2876162"/>
+              <a:ext cx="815616" cy="276999"/>
+            </a:xfrm>
+            <a:prstGeom prst="rect">
+              <a:avLst/>
+            </a:prstGeom>
+            <a:solidFill>
+              <a:schemeClr val="bg1"/>
+            </a:solidFill>
+            <a:ln>
+              <a:solidFill>
+                <a:srgbClr val="00B050"/>
+              </a:solidFill>
+            </a:ln>
+          </p:spPr>
+          <p:txBody>
+            <a:bodyPr wrap="square" rtlCol="0">
+              <a:spAutoFit/>
+            </a:bodyPr>
+            <a:lstStyle/>
+            <a:p>
+              <a:r>
+                <a:rPr lang="de-DE" sz="1200" dirty="0" err="1"/>
+                <a:t>Mz</a:t>
+              </a:r>
+              <a:r>
+                <a:rPr lang="de-DE" sz="1200" dirty="0"/>
+                <a:t>, </a:t>
+              </a:r>
+              <a:r>
+                <a:rPr lang="de-DE" sz="1200" dirty="0" err="1"/>
+                <a:t>Fz</a:t>
+              </a:r>
+              <a:endParaRPr lang="de-DE" sz="1200" dirty="0"/>
+            </a:p>
+          </p:txBody>
+        </p:sp>
+        <p:sp>
+          <p:nvSpPr>
+            <p:cNvPr id="15" name="Textfeld 14">
+              <a:extLst>
+                <a:ext uri="{FF2B5EF4-FFF2-40B4-BE49-F238E27FC236}">
+                  <a16:creationId xmlns:a16="http://schemas.microsoft.com/office/drawing/2014/main" id="{2E3ED280-E68F-D32E-2A9D-9D1F416170A8}"/>
+                </a:ext>
+              </a:extLst>
+            </p:cNvPr>
+            <p:cNvSpPr txBox="1"/>
+            <p:nvPr/>
+          </p:nvSpPr>
+          <p:spPr>
+            <a:xfrm>
+              <a:off x="9469513" y="2883168"/>
+              <a:ext cx="815616" cy="276999"/>
+            </a:xfrm>
+            <a:prstGeom prst="rect">
+              <a:avLst/>
+            </a:prstGeom>
+            <a:solidFill>
+              <a:schemeClr val="bg1"/>
+            </a:solidFill>
+            <a:ln>
+              <a:solidFill>
+                <a:srgbClr val="00B050"/>
+              </a:solidFill>
+            </a:ln>
+          </p:spPr>
+          <p:txBody>
+            <a:bodyPr wrap="square" rtlCol="0">
+              <a:spAutoFit/>
+            </a:bodyPr>
+            <a:lstStyle/>
+            <a:p>
+              <a:r>
+                <a:rPr lang="de-DE" sz="1200" dirty="0"/>
+                <a:t>My, </a:t>
+              </a:r>
+              <a:r>
+                <a:rPr lang="de-DE" sz="1200" dirty="0" err="1"/>
+                <a:t>Fy</a:t>
+              </a:r>
+              <a:endParaRPr lang="de-DE" sz="1200" dirty="0"/>
+            </a:p>
+          </p:txBody>
+        </p:sp>
+      </p:grpSp>
+      <p:grpSp>
+        <p:nvGrpSpPr>
+          <p:cNvPr id="20" name="Gruppieren 19">
+            <a:extLst>
+              <a:ext uri="{FF2B5EF4-FFF2-40B4-BE49-F238E27FC236}">
+                <a16:creationId xmlns:a16="http://schemas.microsoft.com/office/drawing/2014/main" id="{969A6FD6-4AB0-5802-B02F-216AD9BC83F1}"/>
+              </a:ext>
+            </a:extLst>
+          </p:cNvPr>
+          <p:cNvGrpSpPr/>
+          <p:nvPr/>
+        </p:nvGrpSpPr>
+        <p:grpSpPr>
+          <a:xfrm>
+            <a:off x="9127961" y="964458"/>
+            <a:ext cx="2874748" cy="3976501"/>
+            <a:chOff x="1002159" y="1105469"/>
+            <a:chExt cx="2874748" cy="3976501"/>
+          </a:xfrm>
+        </p:grpSpPr>
+        <p:pic>
+          <p:nvPicPr>
+            <p:cNvPr id="2" name="Grafik 1">
+              <a:extLst>
+                <a:ext uri="{FF2B5EF4-FFF2-40B4-BE49-F238E27FC236}">
+                  <a16:creationId xmlns:a16="http://schemas.microsoft.com/office/drawing/2014/main" id="{4DD5ED16-24FB-4B78-A064-E5266E322B63}"/>
+                </a:ext>
+              </a:extLst>
+            </p:cNvPr>
+            <p:cNvPicPr>
+              <a:picLocks noChangeAspect="1"/>
+            </p:cNvPicPr>
+            <p:nvPr/>
+          </p:nvPicPr>
+          <p:blipFill>
+            <a:blip r:embed="rId2"/>
+            <a:stretch>
+              <a:fillRect/>
+            </a:stretch>
+          </p:blipFill>
+          <p:spPr>
+            <a:xfrm>
+              <a:off x="1285843" y="1105469"/>
+              <a:ext cx="2540123" cy="3976501"/>
+            </a:xfrm>
+            <a:prstGeom prst="rect">
+              <a:avLst/>
+            </a:prstGeom>
+          </p:spPr>
+        </p:pic>
+        <p:sp>
+          <p:nvSpPr>
+            <p:cNvPr id="16" name="Textfeld 15">
+              <a:extLst>
+                <a:ext uri="{FF2B5EF4-FFF2-40B4-BE49-F238E27FC236}">
+                  <a16:creationId xmlns:a16="http://schemas.microsoft.com/office/drawing/2014/main" id="{91E4EB69-CB9B-3887-D5B0-083E913981CC}"/>
+                </a:ext>
+              </a:extLst>
+            </p:cNvPr>
+            <p:cNvSpPr txBox="1"/>
+            <p:nvPr/>
+          </p:nvSpPr>
+          <p:spPr>
+            <a:xfrm>
+              <a:off x="2032215" y="1790190"/>
+              <a:ext cx="815616" cy="276999"/>
+            </a:xfrm>
+            <a:prstGeom prst="rect">
+              <a:avLst/>
+            </a:prstGeom>
+            <a:solidFill>
+              <a:schemeClr val="bg1"/>
+            </a:solidFill>
+            <a:ln>
+              <a:solidFill>
+                <a:srgbClr val="00B050"/>
+              </a:solidFill>
+            </a:ln>
+          </p:spPr>
+          <p:txBody>
+            <a:bodyPr wrap="square" rtlCol="0">
+              <a:spAutoFit/>
+            </a:bodyPr>
+            <a:lstStyle/>
+            <a:p>
+              <a:r>
+                <a:rPr lang="de-DE" sz="1200" dirty="0" err="1"/>
+                <a:t>Mz</a:t>
+              </a:r>
+              <a:r>
+                <a:rPr lang="de-DE" sz="1200" dirty="0"/>
+                <a:t>, </a:t>
+              </a:r>
+              <a:r>
+                <a:rPr lang="de-DE" sz="1200" dirty="0" err="1"/>
+                <a:t>Fz</a:t>
+              </a:r>
+              <a:endParaRPr lang="de-DE" sz="1200" dirty="0"/>
+            </a:p>
+          </p:txBody>
+        </p:sp>
+        <p:sp>
+          <p:nvSpPr>
+            <p:cNvPr id="17" name="Textfeld 16">
+              <a:extLst>
+                <a:ext uri="{FF2B5EF4-FFF2-40B4-BE49-F238E27FC236}">
+                  <a16:creationId xmlns:a16="http://schemas.microsoft.com/office/drawing/2014/main" id="{C2E0214C-C3FC-9A82-35AC-A1418BC51AE6}"/>
+                </a:ext>
+              </a:extLst>
+            </p:cNvPr>
+            <p:cNvSpPr txBox="1"/>
+            <p:nvPr/>
+          </p:nvSpPr>
+          <p:spPr>
+            <a:xfrm>
+              <a:off x="1002159" y="2184432"/>
+              <a:ext cx="815616" cy="276999"/>
+            </a:xfrm>
+            <a:prstGeom prst="rect">
+              <a:avLst/>
+            </a:prstGeom>
+            <a:solidFill>
+              <a:schemeClr val="bg1"/>
+            </a:solidFill>
+            <a:ln>
+              <a:solidFill>
+                <a:srgbClr val="00B050"/>
+              </a:solidFill>
+            </a:ln>
+          </p:spPr>
+          <p:txBody>
+            <a:bodyPr wrap="square" rtlCol="0">
+              <a:spAutoFit/>
+            </a:bodyPr>
+            <a:lstStyle/>
+            <a:p>
+              <a:r>
+                <a:rPr lang="de-DE" sz="1200" dirty="0"/>
+                <a:t>My, </a:t>
+              </a:r>
+              <a:r>
+                <a:rPr lang="de-DE" sz="1200" dirty="0" err="1"/>
+                <a:t>Fy</a:t>
+              </a:r>
+              <a:endParaRPr lang="de-DE" sz="1200" dirty="0"/>
+            </a:p>
+          </p:txBody>
+        </p:sp>
+        <p:sp>
+          <p:nvSpPr>
+            <p:cNvPr id="18" name="Textfeld 17">
+              <a:extLst>
+                <a:ext uri="{FF2B5EF4-FFF2-40B4-BE49-F238E27FC236}">
+                  <a16:creationId xmlns:a16="http://schemas.microsoft.com/office/drawing/2014/main" id="{794FBBF6-B467-2B7A-B279-18904068E002}"/>
+                </a:ext>
+              </a:extLst>
+            </p:cNvPr>
+            <p:cNvSpPr txBox="1"/>
+            <p:nvPr/>
+          </p:nvSpPr>
+          <p:spPr>
+            <a:xfrm>
+              <a:off x="3061291" y="2484297"/>
+              <a:ext cx="815616" cy="276999"/>
+            </a:xfrm>
+            <a:prstGeom prst="rect">
+              <a:avLst/>
+            </a:prstGeom>
+            <a:solidFill>
+              <a:schemeClr val="bg1"/>
+            </a:solidFill>
+            <a:ln>
+              <a:solidFill>
+                <a:srgbClr val="00B050"/>
+              </a:solidFill>
+            </a:ln>
+          </p:spPr>
+          <p:txBody>
+            <a:bodyPr wrap="square" rtlCol="0">
+              <a:spAutoFit/>
+            </a:bodyPr>
+            <a:lstStyle/>
+            <a:p>
+              <a:r>
+                <a:rPr lang="de-DE" sz="1200" dirty="0" err="1"/>
+                <a:t>Mx</a:t>
+              </a:r>
+              <a:r>
+                <a:rPr lang="de-DE" sz="1200" dirty="0"/>
+                <a:t>, </a:t>
+              </a:r>
+              <a:r>
+                <a:rPr lang="de-DE" sz="1200" dirty="0" err="1"/>
+                <a:t>Fx</a:t>
+              </a:r>
+              <a:endParaRPr lang="de-DE" sz="1200" dirty="0"/>
+            </a:p>
+          </p:txBody>
+        </p:sp>
+      </p:grpSp>
+      <p:sp>
+        <p:nvSpPr>
+          <p:cNvPr id="19" name="Textfeld 18">
+            <a:extLst>
+              <a:ext uri="{FF2B5EF4-FFF2-40B4-BE49-F238E27FC236}">
+                <a16:creationId xmlns:a16="http://schemas.microsoft.com/office/drawing/2014/main" id="{1B5F496A-0E78-0A21-9282-6C5E6529A62D}"/>
+              </a:ext>
+            </a:extLst>
+          </p:cNvPr>
+          <p:cNvSpPr txBox="1"/>
+          <p:nvPr/>
+        </p:nvSpPr>
+        <p:spPr>
+          <a:xfrm>
+            <a:off x="1409967" y="151054"/>
+            <a:ext cx="4642165" cy="369332"/>
+          </a:xfrm>
+          <a:prstGeom prst="rect">
+            <a:avLst/>
+          </a:prstGeom>
+          <a:noFill/>
+        </p:spPr>
+        <p:txBody>
+          <a:bodyPr wrap="square" rtlCol="0">
+            <a:spAutoFit/>
+          </a:bodyPr>
+          <a:lstStyle/>
+          <a:p>
+            <a:r>
+              <a:rPr lang="de-DE" dirty="0"/>
+              <a:t>Lasten </a:t>
+            </a:r>
+            <a:r>
+              <a:rPr lang="de-DE" dirty="0" err="1"/>
+              <a:t>Kosy</a:t>
+            </a:r>
+            <a:r>
+              <a:rPr lang="de-DE" dirty="0"/>
+              <a:t> WTN </a:t>
+            </a:r>
+            <a:r>
+              <a:rPr lang="de-DE" dirty="0">
+                <a:sym typeface="Wingdings" panose="05000000000000000000" pitchFamily="2" charset="2"/>
+              </a:rPr>
+              <a:t> IEA</a:t>
+            </a:r>
+            <a:endParaRPr lang="de-DE" dirty="0"/>
+          </a:p>
+        </p:txBody>
+      </p:sp>
+    </p:spTree>
+    <p:extLst>
+      <p:ext uri="{BB962C8B-B14F-4D97-AF65-F5344CB8AC3E}">
+        <p14:creationId xmlns:p14="http://schemas.microsoft.com/office/powerpoint/2010/main" val="331663060"/>
       </p:ext>
     </p:extLst>
   </p:cSld>

</xml_diff>